<commit_message>
add model with alexnet structure
</commit_message>
<xml_diff>
--- a/face_detection_report.pptx
+++ b/face_detection_report.pptx
@@ -7,11 +7,14 @@
   <p:sldIdLst>
     <p:sldId id="256" r:id="rId2"/>
     <p:sldId id="257" r:id="rId3"/>
-    <p:sldId id="258" r:id="rId4"/>
-    <p:sldId id="259" r:id="rId5"/>
-    <p:sldId id="260" r:id="rId6"/>
-    <p:sldId id="261" r:id="rId7"/>
-    <p:sldId id="262" r:id="rId8"/>
+    <p:sldId id="263" r:id="rId4"/>
+    <p:sldId id="258" r:id="rId5"/>
+    <p:sldId id="259" r:id="rId6"/>
+    <p:sldId id="260" r:id="rId7"/>
+    <p:sldId id="264" r:id="rId8"/>
+    <p:sldId id="265" r:id="rId9"/>
+    <p:sldId id="261" r:id="rId10"/>
+    <p:sldId id="262" r:id="rId11"/>
   </p:sldIdLst>
   <p:sldSz cx="12192000" cy="6858000"/>
   <p:notesSz cx="6858000" cy="9144000"/>
@@ -110,6 +113,11 @@
       </a:defRPr>
     </a:lvl9pPr>
   </p:defaultTextStyle>
+  <p:extLst>
+    <p:ext uri="{EFAFB233-063F-42B5-8137-9DF3F51BA10A}">
+      <p15:sldGuideLst xmlns:p15="http://schemas.microsoft.com/office/powerpoint/2012/main"/>
+    </p:ext>
+  </p:extLst>
 </p:presentation>
 </file>
 
@@ -244,7 +252,7 @@
           <a:p>
             <a:fld id="{880C2038-6CE3-4621-87EF-6AC1FE84D6AF}" type="datetimeFigureOut">
               <a:rPr lang="en-US" smtClean="0"/>
-              <a:t>22/11/20</a:t>
+              <a:t>24/11/20</a:t>
             </a:fld>
             <a:endParaRPr lang="en-US"/>
           </a:p>
@@ -414,7 +422,7 @@
           <a:p>
             <a:fld id="{880C2038-6CE3-4621-87EF-6AC1FE84D6AF}" type="datetimeFigureOut">
               <a:rPr lang="en-US" smtClean="0"/>
-              <a:t>22/11/20</a:t>
+              <a:t>24/11/20</a:t>
             </a:fld>
             <a:endParaRPr lang="en-US"/>
           </a:p>
@@ -594,7 +602,7 @@
           <a:p>
             <a:fld id="{880C2038-6CE3-4621-87EF-6AC1FE84D6AF}" type="datetimeFigureOut">
               <a:rPr lang="en-US" smtClean="0"/>
-              <a:t>22/11/20</a:t>
+              <a:t>24/11/20</a:t>
             </a:fld>
             <a:endParaRPr lang="en-US"/>
           </a:p>
@@ -764,7 +772,7 @@
           <a:p>
             <a:fld id="{880C2038-6CE3-4621-87EF-6AC1FE84D6AF}" type="datetimeFigureOut">
               <a:rPr lang="en-US" smtClean="0"/>
-              <a:t>22/11/20</a:t>
+              <a:t>24/11/20</a:t>
             </a:fld>
             <a:endParaRPr lang="en-US"/>
           </a:p>
@@ -1010,7 +1018,7 @@
           <a:p>
             <a:fld id="{880C2038-6CE3-4621-87EF-6AC1FE84D6AF}" type="datetimeFigureOut">
               <a:rPr lang="en-US" smtClean="0"/>
-              <a:t>22/11/20</a:t>
+              <a:t>24/11/20</a:t>
             </a:fld>
             <a:endParaRPr lang="en-US"/>
           </a:p>
@@ -1242,7 +1250,7 @@
           <a:p>
             <a:fld id="{880C2038-6CE3-4621-87EF-6AC1FE84D6AF}" type="datetimeFigureOut">
               <a:rPr lang="en-US" smtClean="0"/>
-              <a:t>22/11/20</a:t>
+              <a:t>24/11/20</a:t>
             </a:fld>
             <a:endParaRPr lang="en-US"/>
           </a:p>
@@ -1609,7 +1617,7 @@
           <a:p>
             <a:fld id="{880C2038-6CE3-4621-87EF-6AC1FE84D6AF}" type="datetimeFigureOut">
               <a:rPr lang="en-US" smtClean="0"/>
-              <a:t>22/11/20</a:t>
+              <a:t>24/11/20</a:t>
             </a:fld>
             <a:endParaRPr lang="en-US"/>
           </a:p>
@@ -1727,7 +1735,7 @@
           <a:p>
             <a:fld id="{880C2038-6CE3-4621-87EF-6AC1FE84D6AF}" type="datetimeFigureOut">
               <a:rPr lang="en-US" smtClean="0"/>
-              <a:t>22/11/20</a:t>
+              <a:t>24/11/20</a:t>
             </a:fld>
             <a:endParaRPr lang="en-US"/>
           </a:p>
@@ -1822,7 +1830,7 @@
           <a:p>
             <a:fld id="{880C2038-6CE3-4621-87EF-6AC1FE84D6AF}" type="datetimeFigureOut">
               <a:rPr lang="en-US" smtClean="0"/>
-              <a:t>22/11/20</a:t>
+              <a:t>24/11/20</a:t>
             </a:fld>
             <a:endParaRPr lang="en-US"/>
           </a:p>
@@ -2099,7 +2107,7 @@
           <a:p>
             <a:fld id="{880C2038-6CE3-4621-87EF-6AC1FE84D6AF}" type="datetimeFigureOut">
               <a:rPr lang="en-US" smtClean="0"/>
-              <a:t>22/11/20</a:t>
+              <a:t>24/11/20</a:t>
             </a:fld>
             <a:endParaRPr lang="en-US"/>
           </a:p>
@@ -2352,7 +2360,7 @@
           <a:p>
             <a:fld id="{880C2038-6CE3-4621-87EF-6AC1FE84D6AF}" type="datetimeFigureOut">
               <a:rPr lang="en-US" smtClean="0"/>
-              <a:t>22/11/20</a:t>
+              <a:t>24/11/20</a:t>
             </a:fld>
             <a:endParaRPr lang="en-US"/>
           </a:p>
@@ -2565,7 +2573,7 @@
           <a:p>
             <a:fld id="{880C2038-6CE3-4621-87EF-6AC1FE84D6AF}" type="datetimeFigureOut">
               <a:rPr lang="en-US" smtClean="0"/>
-              <a:t>22/11/20</a:t>
+              <a:t>24/11/20</a:t>
             </a:fld>
             <a:endParaRPr lang="en-US"/>
           </a:p>
@@ -3325,6 +3333,261 @@
 </p:sld>
 </file>
 
+<file path=ppt/slides/slide10.xml><?xml version="1.0" encoding="utf-8"?>
+<p:sld xmlns:a="http://schemas.openxmlformats.org/drawingml/2006/main" xmlns:r="http://schemas.openxmlformats.org/officeDocument/2006/relationships" xmlns:p="http://schemas.openxmlformats.org/presentationml/2006/main">
+  <p:cSld>
+    <p:spTree>
+      <p:nvGrpSpPr>
+        <p:cNvPr id="1" name=""/>
+        <p:cNvGrpSpPr/>
+        <p:nvPr/>
+      </p:nvGrpSpPr>
+      <p:grpSpPr>
+        <a:xfrm>
+          <a:off x="0" y="0"/>
+          <a:ext cx="0" cy="0"/>
+          <a:chOff x="0" y="0"/>
+          <a:chExt cx="0" cy="0"/>
+        </a:xfrm>
+      </p:grpSpPr>
+      <p:sp>
+        <p:nvSpPr>
+          <p:cNvPr id="6" name="Inhaltsplatzhalter 3"/>
+          <p:cNvSpPr txBox="1">
+            <a:spLocks/>
+          </p:cNvSpPr>
+          <p:nvPr/>
+        </p:nvSpPr>
+        <p:spPr>
+          <a:xfrm>
+            <a:off x="468000" y="1424991"/>
+            <a:ext cx="11244574" cy="4184239"/>
+          </a:xfrm>
+          <a:prstGeom prst="rect">
+            <a:avLst/>
+          </a:prstGeom>
+        </p:spPr>
+        <p:txBody>
+          <a:bodyPr vert="horz" lIns="91440" tIns="45720" rIns="91440" bIns="45720" rtlCol="0">
+            <a:normAutofit/>
+          </a:bodyPr>
+          <a:lstStyle>
+            <a:lvl1pPr marL="0" indent="0" algn="ctr" defTabSz="914400" rtl="0" eaLnBrk="1" latinLnBrk="0" hangingPunct="1">
+              <a:lnSpc>
+                <a:spcPct val="90000"/>
+              </a:lnSpc>
+              <a:spcBef>
+                <a:spcPts val="1000"/>
+              </a:spcBef>
+              <a:buFont typeface="Arial" panose="020B0604020202020204" pitchFamily="34" charset="0"/>
+              <a:buNone/>
+              <a:defRPr sz="2400" kern="1200">
+                <a:solidFill>
+                  <a:schemeClr val="tx1"/>
+                </a:solidFill>
+                <a:latin typeface="+mn-lt"/>
+                <a:ea typeface="+mn-ea"/>
+                <a:cs typeface="+mn-cs"/>
+              </a:defRPr>
+            </a:lvl1pPr>
+            <a:lvl2pPr marL="457200" indent="0" algn="ctr" defTabSz="914400" rtl="0" eaLnBrk="1" latinLnBrk="0" hangingPunct="1">
+              <a:lnSpc>
+                <a:spcPct val="90000"/>
+              </a:lnSpc>
+              <a:spcBef>
+                <a:spcPts val="500"/>
+              </a:spcBef>
+              <a:buFont typeface="Arial" panose="020B0604020202020204" pitchFamily="34" charset="0"/>
+              <a:buNone/>
+              <a:defRPr sz="2000" kern="1200">
+                <a:solidFill>
+                  <a:schemeClr val="tx1"/>
+                </a:solidFill>
+                <a:latin typeface="+mn-lt"/>
+                <a:ea typeface="+mn-ea"/>
+                <a:cs typeface="+mn-cs"/>
+              </a:defRPr>
+            </a:lvl2pPr>
+            <a:lvl3pPr marL="914400" indent="0" algn="ctr" defTabSz="914400" rtl="0" eaLnBrk="1" latinLnBrk="0" hangingPunct="1">
+              <a:lnSpc>
+                <a:spcPct val="90000"/>
+              </a:lnSpc>
+              <a:spcBef>
+                <a:spcPts val="500"/>
+              </a:spcBef>
+              <a:buFont typeface="Arial" panose="020B0604020202020204" pitchFamily="34" charset="0"/>
+              <a:buNone/>
+              <a:defRPr sz="1800" kern="1200">
+                <a:solidFill>
+                  <a:schemeClr val="tx1"/>
+                </a:solidFill>
+                <a:latin typeface="+mn-lt"/>
+                <a:ea typeface="+mn-ea"/>
+                <a:cs typeface="+mn-cs"/>
+              </a:defRPr>
+            </a:lvl3pPr>
+            <a:lvl4pPr marL="1371600" indent="0" algn="ctr" defTabSz="914400" rtl="0" eaLnBrk="1" latinLnBrk="0" hangingPunct="1">
+              <a:lnSpc>
+                <a:spcPct val="90000"/>
+              </a:lnSpc>
+              <a:spcBef>
+                <a:spcPts val="500"/>
+              </a:spcBef>
+              <a:buFont typeface="Arial" panose="020B0604020202020204" pitchFamily="34" charset="0"/>
+              <a:buNone/>
+              <a:defRPr sz="1600" kern="1200">
+                <a:solidFill>
+                  <a:schemeClr val="tx1"/>
+                </a:solidFill>
+                <a:latin typeface="+mn-lt"/>
+                <a:ea typeface="+mn-ea"/>
+                <a:cs typeface="+mn-cs"/>
+              </a:defRPr>
+            </a:lvl4pPr>
+            <a:lvl5pPr marL="1828800" indent="0" algn="ctr" defTabSz="914400" rtl="0" eaLnBrk="1" latinLnBrk="0" hangingPunct="1">
+              <a:lnSpc>
+                <a:spcPct val="90000"/>
+              </a:lnSpc>
+              <a:spcBef>
+                <a:spcPts val="500"/>
+              </a:spcBef>
+              <a:buFont typeface="Arial" panose="020B0604020202020204" pitchFamily="34" charset="0"/>
+              <a:buNone/>
+              <a:defRPr sz="1600" kern="1200">
+                <a:solidFill>
+                  <a:schemeClr val="tx1"/>
+                </a:solidFill>
+                <a:latin typeface="+mn-lt"/>
+                <a:ea typeface="+mn-ea"/>
+                <a:cs typeface="+mn-cs"/>
+              </a:defRPr>
+            </a:lvl5pPr>
+            <a:lvl6pPr marL="2286000" indent="0" algn="ctr" defTabSz="914400" rtl="0" eaLnBrk="1" latinLnBrk="0" hangingPunct="1">
+              <a:lnSpc>
+                <a:spcPct val="90000"/>
+              </a:lnSpc>
+              <a:spcBef>
+                <a:spcPts val="500"/>
+              </a:spcBef>
+              <a:buFont typeface="Arial" panose="020B0604020202020204" pitchFamily="34" charset="0"/>
+              <a:buNone/>
+              <a:defRPr sz="1600" kern="1200">
+                <a:solidFill>
+                  <a:schemeClr val="tx1"/>
+                </a:solidFill>
+                <a:latin typeface="+mn-lt"/>
+                <a:ea typeface="+mn-ea"/>
+                <a:cs typeface="+mn-cs"/>
+              </a:defRPr>
+            </a:lvl6pPr>
+            <a:lvl7pPr marL="2743200" indent="0" algn="ctr" defTabSz="914400" rtl="0" eaLnBrk="1" latinLnBrk="0" hangingPunct="1">
+              <a:lnSpc>
+                <a:spcPct val="90000"/>
+              </a:lnSpc>
+              <a:spcBef>
+                <a:spcPts val="500"/>
+              </a:spcBef>
+              <a:buFont typeface="Arial" panose="020B0604020202020204" pitchFamily="34" charset="0"/>
+              <a:buNone/>
+              <a:defRPr sz="1600" kern="1200">
+                <a:solidFill>
+                  <a:schemeClr val="tx1"/>
+                </a:solidFill>
+                <a:latin typeface="+mn-lt"/>
+                <a:ea typeface="+mn-ea"/>
+                <a:cs typeface="+mn-cs"/>
+              </a:defRPr>
+            </a:lvl7pPr>
+            <a:lvl8pPr marL="3200400" indent="0" algn="ctr" defTabSz="914400" rtl="0" eaLnBrk="1" latinLnBrk="0" hangingPunct="1">
+              <a:lnSpc>
+                <a:spcPct val="90000"/>
+              </a:lnSpc>
+              <a:spcBef>
+                <a:spcPts val="500"/>
+              </a:spcBef>
+              <a:buFont typeface="Arial" panose="020B0604020202020204" pitchFamily="34" charset="0"/>
+              <a:buNone/>
+              <a:defRPr sz="1600" kern="1200">
+                <a:solidFill>
+                  <a:schemeClr val="tx1"/>
+                </a:solidFill>
+                <a:latin typeface="+mn-lt"/>
+                <a:ea typeface="+mn-ea"/>
+                <a:cs typeface="+mn-cs"/>
+              </a:defRPr>
+            </a:lvl8pPr>
+            <a:lvl9pPr marL="3657600" indent="0" algn="ctr" defTabSz="914400" rtl="0" eaLnBrk="1" latinLnBrk="0" hangingPunct="1">
+              <a:lnSpc>
+                <a:spcPct val="90000"/>
+              </a:lnSpc>
+              <a:spcBef>
+                <a:spcPts val="500"/>
+              </a:spcBef>
+              <a:buFont typeface="Arial" panose="020B0604020202020204" pitchFamily="34" charset="0"/>
+              <a:buNone/>
+              <a:defRPr sz="1600" kern="1200">
+                <a:solidFill>
+                  <a:schemeClr val="tx1"/>
+                </a:solidFill>
+                <a:latin typeface="+mn-lt"/>
+                <a:ea typeface="+mn-ea"/>
+                <a:cs typeface="+mn-cs"/>
+              </a:defRPr>
+            </a:lvl9pPr>
+          </a:lstStyle>
+          <a:p>
+            <a:pPr marL="342900" indent="-342900" algn="l">
+              <a:buFont typeface="Arial" panose="020B0604020202020204" pitchFamily="34" charset="0"/>
+              <a:buChar char="•"/>
+            </a:pPr>
+            <a:r>
+              <a:rPr lang="en-US" smtClean="0">
+                <a:latin typeface="Times New Roman" panose="02020603050405020304" pitchFamily="18" charset="0"/>
+                <a:cs typeface="Times New Roman" panose="02020603050405020304" pitchFamily="18" charset="0"/>
+              </a:rPr>
+              <a:t>Reference</a:t>
+            </a:r>
+          </a:p>
+          <a:p>
+            <a:pPr marL="1257300" lvl="2" indent="-342900" algn="l">
+              <a:buFont typeface="Wingdings" panose="05000000000000000000" pitchFamily="2" charset="2"/>
+              <a:buChar char="Ø"/>
+            </a:pPr>
+            <a:r>
+              <a:rPr lang="en-US" smtClean="0">
+                <a:latin typeface="Times New Roman" panose="02020603050405020304" pitchFamily="18" charset="0"/>
+                <a:cs typeface="Times New Roman" panose="02020603050405020304" pitchFamily="18" charset="0"/>
+                <a:hlinkClick r:id="rId2"/>
+              </a:rPr>
+              <a:t>https://www.tensorflow.org/tutorials/keras/classification</a:t>
+            </a:r>
+            <a:r>
+              <a:rPr lang="en-US" smtClean="0">
+                <a:latin typeface="Times New Roman" panose="02020603050405020304" pitchFamily="18" charset="0"/>
+                <a:cs typeface="Times New Roman" panose="02020603050405020304" pitchFamily="18" charset="0"/>
+              </a:rPr>
+              <a:t> </a:t>
+            </a:r>
+            <a:endParaRPr lang="en-US">
+              <a:latin typeface="Times New Roman" panose="02020603050405020304" pitchFamily="18" charset="0"/>
+              <a:cs typeface="Times New Roman" panose="02020603050405020304" pitchFamily="18" charset="0"/>
+            </a:endParaRPr>
+          </a:p>
+        </p:txBody>
+      </p:sp>
+    </p:spTree>
+    <p:extLst>
+      <p:ext uri="{BB962C8B-B14F-4D97-AF65-F5344CB8AC3E}">
+        <p14:creationId xmlns:p14="http://schemas.microsoft.com/office/powerpoint/2010/main" val="1148817094"/>
+      </p:ext>
+    </p:extLst>
+  </p:cSld>
+  <p:clrMapOvr>
+    <a:masterClrMapping/>
+  </p:clrMapOvr>
+</p:sld>
+</file>
+
 <file path=ppt/slides/slide2.xml><?xml version="1.0" encoding="utf-8"?>
 <p:sld xmlns:a="http://schemas.openxmlformats.org/drawingml/2006/main" xmlns:r="http://schemas.openxmlformats.org/officeDocument/2006/relationships" xmlns:p="http://schemas.openxmlformats.org/presentationml/2006/main">
   <p:cSld>
@@ -3344,7 +3607,74 @@
       </p:grpSpPr>
       <p:sp>
         <p:nvSpPr>
-          <p:cNvPr id="6" name="Inhaltsplatzhalter 3"/>
+          <p:cNvPr id="3" name="Titel 1"/>
+          <p:cNvSpPr txBox="1">
+            <a:spLocks/>
+          </p:cNvSpPr>
+          <p:nvPr/>
+        </p:nvSpPr>
+        <p:spPr>
+          <a:xfrm>
+            <a:off x="467999" y="423081"/>
+            <a:ext cx="11244575" cy="629655"/>
+          </a:xfrm>
+          <a:prstGeom prst="rect">
+            <a:avLst/>
+          </a:prstGeom>
+          <a:solidFill>
+            <a:schemeClr val="accent1">
+              <a:lumMod val="75000"/>
+            </a:schemeClr>
+          </a:solidFill>
+        </p:spPr>
+        <p:txBody>
+          <a:bodyPr vert="horz" lIns="91440" tIns="45720" rIns="91440" bIns="45720" rtlCol="0" anchor="b">
+            <a:normAutofit fontScale="77500" lnSpcReduction="20000"/>
+          </a:bodyPr>
+          <a:lstStyle>
+            <a:lvl1pPr algn="ctr" defTabSz="914400" rtl="0" eaLnBrk="1" latinLnBrk="0" hangingPunct="1">
+              <a:lnSpc>
+                <a:spcPct val="90000"/>
+              </a:lnSpc>
+              <a:spcBef>
+                <a:spcPct val="0"/>
+              </a:spcBef>
+              <a:buNone/>
+              <a:defRPr sz="6000" kern="1200">
+                <a:solidFill>
+                  <a:schemeClr val="tx1"/>
+                </a:solidFill>
+                <a:latin typeface="+mj-lt"/>
+                <a:ea typeface="+mj-ea"/>
+                <a:cs typeface="+mj-cs"/>
+              </a:defRPr>
+            </a:lvl1pPr>
+          </a:lstStyle>
+          <a:p>
+            <a:pPr algn="l"/>
+            <a:r>
+              <a:rPr lang="en-US" b="1" cap="all" smtClean="0">
+                <a:solidFill>
+                  <a:schemeClr val="bg1"/>
+                </a:solidFill>
+                <a:latin typeface="Times New Roman" panose="02020603050405020304" pitchFamily="18" charset="0"/>
+                <a:cs typeface="Times New Roman" panose="02020603050405020304" pitchFamily="18" charset="0"/>
+              </a:rPr>
+              <a:t>Agenda</a:t>
+            </a:r>
+            <a:endParaRPr lang="en-US" b="1" dirty="0">
+              <a:solidFill>
+                <a:schemeClr val="bg1"/>
+              </a:solidFill>
+              <a:latin typeface="Times New Roman" panose="02020603050405020304" pitchFamily="18" charset="0"/>
+              <a:cs typeface="Times New Roman" panose="02020603050405020304" pitchFamily="18" charset="0"/>
+            </a:endParaRPr>
+          </a:p>
+        </p:txBody>
+      </p:sp>
+      <p:sp>
+        <p:nvSpPr>
+          <p:cNvPr id="4" name="Inhaltsplatzhalter 3"/>
           <p:cNvSpPr txBox="1">
             <a:spLocks/>
           </p:cNvSpPr>
@@ -3353,7 +3683,7 @@
         <p:spPr>
           <a:xfrm>
             <a:off x="468000" y="1424991"/>
-            <a:ext cx="11244574" cy="4184239"/>
+            <a:ext cx="11244574" cy="4505849"/>
           </a:xfrm>
           <a:prstGeom prst="rect">
             <a:avLst/>
@@ -3537,7 +3867,7 @@
                 <a:latin typeface="Times New Roman" panose="02020603050405020304" pitchFamily="18" charset="0"/>
                 <a:cs typeface="Times New Roman" panose="02020603050405020304" pitchFamily="18" charset="0"/>
               </a:rPr>
-              <a:t>The data in assignment have 1020 classes, </a:t>
+              <a:t>Overview </a:t>
             </a:r>
           </a:p>
           <a:p>
@@ -3550,15 +3880,52 @@
                 <a:latin typeface="Times New Roman" panose="02020603050405020304" pitchFamily="18" charset="0"/>
                 <a:cs typeface="Times New Roman" panose="02020603050405020304" pitchFamily="18" charset="0"/>
               </a:rPr>
-              <a:t>I reduced number of classes from 1020 to 10 due to restriction of my Laptop(doesn’t have enough RAM to train model with 1020 classes)</a:t>
-            </a:r>
+              <a:t>Prepare data</a:t>
+            </a:r>
+          </a:p>
+          <a:p>
+            <a:pPr marL="342900" indent="-342900" algn="l">
+              <a:buFont typeface="Arial" panose="020B0604020202020204" pitchFamily="34" charset="0"/>
+              <a:buChar char="•"/>
+            </a:pPr>
+            <a:r>
+              <a:rPr lang="en-US" smtClean="0">
+                <a:latin typeface="Times New Roman" panose="02020603050405020304" pitchFamily="18" charset="0"/>
+                <a:cs typeface="Times New Roman" panose="02020603050405020304" pitchFamily="18" charset="0"/>
+              </a:rPr>
+              <a:t>Model 1</a:t>
+            </a:r>
+          </a:p>
+          <a:p>
+            <a:pPr marL="342900" indent="-342900" algn="l">
+              <a:buFont typeface="Arial" panose="020B0604020202020204" pitchFamily="34" charset="0"/>
+              <a:buChar char="•"/>
+            </a:pPr>
+            <a:r>
+              <a:rPr lang="en-US" smtClean="0">
+                <a:latin typeface="Times New Roman" panose="02020603050405020304" pitchFamily="18" charset="0"/>
+                <a:cs typeface="Times New Roman" panose="02020603050405020304" pitchFamily="18" charset="0"/>
+              </a:rPr>
+              <a:t>Model 2 (Alexnet structure)</a:t>
+            </a:r>
+          </a:p>
+          <a:p>
+            <a:pPr marL="342900" indent="-342900" algn="l">
+              <a:buFont typeface="Arial" panose="020B0604020202020204" pitchFamily="34" charset="0"/>
+              <a:buChar char="•"/>
+            </a:pPr>
+            <a:endParaRPr lang="en-US" smtClean="0"/>
           </a:p>
           <a:p>
             <a:pPr algn="l"/>
-            <a:endParaRPr lang="en-US" dirty="0">
-              <a:latin typeface="Times New Roman" panose="02020603050405020304" pitchFamily="18" charset="0"/>
-              <a:cs typeface="Times New Roman" panose="02020603050405020304" pitchFamily="18" charset="0"/>
-            </a:endParaRPr>
+            <a:r>
+              <a:rPr lang="en-US" smtClean="0"/>
+              <a:t>					</a:t>
+            </a:r>
+          </a:p>
+          <a:p>
+            <a:pPr algn="l"/>
+            <a:endParaRPr lang="en-US" b="1" dirty="0"/>
           </a:p>
         </p:txBody>
       </p:sp>
@@ -3787,131 +4154,102 @@
                 <a:latin typeface="Times New Roman" panose="02020603050405020304" pitchFamily="18" charset="0"/>
                 <a:cs typeface="Times New Roman" panose="02020603050405020304" pitchFamily="18" charset="0"/>
               </a:rPr>
-              <a:t>source code from Github</a:t>
-            </a:r>
-          </a:p>
-          <a:p>
-            <a:pPr marL="800100" lvl="1" indent="-342900" algn="l">
-              <a:buFont typeface="Wingdings" panose="05000000000000000000" pitchFamily="2" charset="2"/>
-              <a:buChar char="Ø"/>
+              <a:t>The data in assignment have 1020 classes, </a:t>
+            </a:r>
+          </a:p>
+          <a:p>
+            <a:pPr marL="342900" indent="-342900" algn="l">
+              <a:buFont typeface="Arial" panose="020B0604020202020204" pitchFamily="34" charset="0"/>
+              <a:buChar char="•"/>
             </a:pPr>
-            <a:r>
-              <a:rPr lang="en-US">
-                <a:latin typeface="Times New Roman" panose="02020603050405020304" pitchFamily="18" charset="0"/>
-                <a:cs typeface="Times New Roman" panose="02020603050405020304" pitchFamily="18" charset="0"/>
-              </a:rPr>
-              <a:t>g</a:t>
-            </a:r>
             <a:r>
               <a:rPr lang="en-US" smtClean="0">
                 <a:latin typeface="Times New Roman" panose="02020603050405020304" pitchFamily="18" charset="0"/>
                 <a:cs typeface="Times New Roman" panose="02020603050405020304" pitchFamily="18" charset="0"/>
               </a:rPr>
-              <a:t>it clone </a:t>
-            </a:r>
-            <a:r>
-              <a:rPr lang="en-US" smtClean="0">
-                <a:latin typeface="Times New Roman" panose="02020603050405020304" pitchFamily="18" charset="0"/>
-                <a:cs typeface="Times New Roman" panose="02020603050405020304" pitchFamily="18" charset="0"/>
-                <a:hlinkClick r:id="rId2"/>
-              </a:rPr>
-              <a:t>https://github.com/hoaquocphan/face_dectection</a:t>
-            </a:r>
-            <a:r>
-              <a:rPr lang="en-US" smtClean="0">
-                <a:latin typeface="Times New Roman" panose="02020603050405020304" pitchFamily="18" charset="0"/>
-                <a:cs typeface="Times New Roman" panose="02020603050405020304" pitchFamily="18" charset="0"/>
-              </a:rPr>
-              <a:t> </a:t>
-            </a:r>
-          </a:p>
-          <a:p>
-            <a:pPr marL="342900" indent="-342900" algn="l">
-              <a:buFont typeface="Arial" panose="020B0604020202020204" pitchFamily="34" charset="0"/>
-              <a:buChar char="•"/>
-            </a:pPr>
-            <a:r>
-              <a:rPr lang="en-US" smtClean="0">
-                <a:latin typeface="Times New Roman" panose="02020603050405020304" pitchFamily="18" charset="0"/>
-                <a:cs typeface="Times New Roman" panose="02020603050405020304" pitchFamily="18" charset="0"/>
-              </a:rPr>
-              <a:t>Run prepare_data.py to prepare data (number of classes = 10)</a:t>
-            </a:r>
-          </a:p>
-          <a:p>
-            <a:pPr marL="800100" lvl="1" indent="-342900" algn="l">
-              <a:buFont typeface="Wingdings" panose="05000000000000000000" pitchFamily="2" charset="2"/>
-              <a:buChar char="Ø"/>
-            </a:pPr>
-            <a:r>
-              <a:rPr lang="en-US">
-                <a:latin typeface="Times New Roman" panose="02020603050405020304" pitchFamily="18" charset="0"/>
-                <a:cs typeface="Times New Roman" panose="02020603050405020304" pitchFamily="18" charset="0"/>
-              </a:rPr>
-              <a:t>p</a:t>
-            </a:r>
-            <a:r>
-              <a:rPr lang="en-US" smtClean="0">
-                <a:latin typeface="Times New Roman" panose="02020603050405020304" pitchFamily="18" charset="0"/>
-                <a:cs typeface="Times New Roman" panose="02020603050405020304" pitchFamily="18" charset="0"/>
-              </a:rPr>
-              <a:t>ython3 </a:t>
-            </a:r>
-            <a:r>
-              <a:rPr lang="en-US" smtClean="0">
-                <a:latin typeface="Times New Roman" panose="02020603050405020304" pitchFamily="18" charset="0"/>
-                <a:cs typeface="Times New Roman" panose="02020603050405020304" pitchFamily="18" charset="0"/>
-              </a:rPr>
-              <a:t>prepare_data.py –n 10 </a:t>
-            </a:r>
-          </a:p>
-          <a:p>
-            <a:pPr marL="800100" lvl="1" indent="-342900" algn="l">
-              <a:buFont typeface="Wingdings" panose="05000000000000000000" pitchFamily="2" charset="2"/>
-              <a:buChar char="Ø"/>
-            </a:pPr>
-            <a:r>
-              <a:rPr lang="en-US" smtClean="0">
-                <a:latin typeface="Times New Roman" panose="02020603050405020304" pitchFamily="18" charset="0"/>
-                <a:cs typeface="Times New Roman" panose="02020603050405020304" pitchFamily="18" charset="0"/>
-              </a:rPr>
-              <a:t>Output of above command: the data of first 10 classes will be devided to 3 folder as below: </a:t>
-            </a:r>
-            <a:endParaRPr lang="en-US">
+              <a:t>I reduced number of classes from 1020 to 10 due to restriction of my Laptop(doesn’t have enough RAM to train model with 1020 classes)</a:t>
+            </a:r>
+          </a:p>
+          <a:p>
+            <a:pPr algn="l"/>
+            <a:endParaRPr lang="en-US" dirty="0">
               <a:latin typeface="Times New Roman" panose="02020603050405020304" pitchFamily="18" charset="0"/>
               <a:cs typeface="Times New Roman" panose="02020603050405020304" pitchFamily="18" charset="0"/>
             </a:endParaRPr>
           </a:p>
         </p:txBody>
       </p:sp>
-      <p:pic>
-        <p:nvPicPr>
-          <p:cNvPr id="2" name="Picture 1"/>
-          <p:cNvPicPr>
-            <a:picLocks noChangeAspect="1"/>
-          </p:cNvPicPr>
+      <p:sp>
+        <p:nvSpPr>
+          <p:cNvPr id="3" name="Titel 1"/>
+          <p:cNvSpPr txBox="1">
+            <a:spLocks/>
+          </p:cNvSpPr>
           <p:nvPr/>
-        </p:nvPicPr>
-        <p:blipFill>
-          <a:blip r:embed="rId3"/>
-          <a:stretch>
-            <a:fillRect/>
-          </a:stretch>
-        </p:blipFill>
+        </p:nvSpPr>
         <p:spPr>
           <a:xfrm>
-            <a:off x="958881" y="3517110"/>
-            <a:ext cx="10262812" cy="1211710"/>
+            <a:off x="467999" y="423081"/>
+            <a:ext cx="11244575" cy="629655"/>
           </a:xfrm>
           <a:prstGeom prst="rect">
             <a:avLst/>
           </a:prstGeom>
+          <a:solidFill>
+            <a:schemeClr val="accent1">
+              <a:lumMod val="75000"/>
+            </a:schemeClr>
+          </a:solidFill>
         </p:spPr>
-      </p:pic>
+        <p:txBody>
+          <a:bodyPr vert="horz" lIns="91440" tIns="45720" rIns="91440" bIns="45720" rtlCol="0" anchor="b">
+            <a:normAutofit fontScale="77500" lnSpcReduction="20000"/>
+          </a:bodyPr>
+          <a:lstStyle>
+            <a:lvl1pPr algn="ctr" defTabSz="914400" rtl="0" eaLnBrk="1" latinLnBrk="0" hangingPunct="1">
+              <a:lnSpc>
+                <a:spcPct val="90000"/>
+              </a:lnSpc>
+              <a:spcBef>
+                <a:spcPct val="0"/>
+              </a:spcBef>
+              <a:buNone/>
+              <a:defRPr sz="6000" kern="1200">
+                <a:solidFill>
+                  <a:schemeClr val="tx1"/>
+                </a:solidFill>
+                <a:latin typeface="+mj-lt"/>
+                <a:ea typeface="+mj-ea"/>
+                <a:cs typeface="+mj-cs"/>
+              </a:defRPr>
+            </a:lvl1pPr>
+          </a:lstStyle>
+          <a:p>
+            <a:pPr algn="l"/>
+            <a:r>
+              <a:rPr lang="en-US" b="1" cap="all" smtClean="0">
+                <a:solidFill>
+                  <a:schemeClr val="bg1"/>
+                </a:solidFill>
+                <a:latin typeface="Times New Roman" panose="02020603050405020304" pitchFamily="18" charset="0"/>
+                <a:cs typeface="Times New Roman" panose="02020603050405020304" pitchFamily="18" charset="0"/>
+              </a:rPr>
+              <a:t>overview</a:t>
+            </a:r>
+            <a:endParaRPr lang="en-US" b="1" dirty="0">
+              <a:solidFill>
+                <a:schemeClr val="bg1"/>
+              </a:solidFill>
+              <a:latin typeface="Times New Roman" panose="02020603050405020304" pitchFamily="18" charset="0"/>
+              <a:cs typeface="Times New Roman" panose="02020603050405020304" pitchFamily="18" charset="0"/>
+            </a:endParaRPr>
+          </a:p>
+        </p:txBody>
+      </p:sp>
     </p:spTree>
     <p:extLst>
       <p:ext uri="{BB962C8B-B14F-4D97-AF65-F5344CB8AC3E}">
-        <p14:creationId xmlns:p14="http://schemas.microsoft.com/office/powerpoint/2010/main" val="3415024831"/>
+        <p14:creationId xmlns:p14="http://schemas.microsoft.com/office/powerpoint/2010/main" val="3270848336"/>
       </p:ext>
     </p:extLst>
   </p:cSld>
@@ -4133,7 +4471,62 @@
                 <a:latin typeface="Times New Roman" panose="02020603050405020304" pitchFamily="18" charset="0"/>
                 <a:cs typeface="Times New Roman" panose="02020603050405020304" pitchFamily="18" charset="0"/>
               </a:rPr>
-              <a:t>Run train_model.py to train model (number of classes = 10)</a:t>
+              <a:t>Clone source </a:t>
+            </a:r>
+            <a:r>
+              <a:rPr lang="en-US" smtClean="0">
+                <a:latin typeface="Times New Roman" panose="02020603050405020304" pitchFamily="18" charset="0"/>
+                <a:cs typeface="Times New Roman" panose="02020603050405020304" pitchFamily="18" charset="0"/>
+              </a:rPr>
+              <a:t>code from Github</a:t>
+            </a:r>
+          </a:p>
+          <a:p>
+            <a:pPr marL="800100" lvl="1" indent="-342900" algn="l">
+              <a:buFont typeface="Wingdings" panose="05000000000000000000" pitchFamily="2" charset="2"/>
+              <a:buChar char="Ø"/>
+            </a:pPr>
+            <a:r>
+              <a:rPr lang="en-US">
+                <a:latin typeface="Times New Roman" panose="02020603050405020304" pitchFamily="18" charset="0"/>
+                <a:cs typeface="Times New Roman" panose="02020603050405020304" pitchFamily="18" charset="0"/>
+              </a:rPr>
+              <a:t>g</a:t>
+            </a:r>
+            <a:r>
+              <a:rPr lang="en-US" smtClean="0">
+                <a:latin typeface="Times New Roman" panose="02020603050405020304" pitchFamily="18" charset="0"/>
+                <a:cs typeface="Times New Roman" panose="02020603050405020304" pitchFamily="18" charset="0"/>
+              </a:rPr>
+              <a:t>it clone </a:t>
+            </a:r>
+            <a:r>
+              <a:rPr lang="en-US" smtClean="0">
+                <a:latin typeface="Times New Roman" panose="02020603050405020304" pitchFamily="18" charset="0"/>
+                <a:cs typeface="Times New Roman" panose="02020603050405020304" pitchFamily="18" charset="0"/>
+                <a:hlinkClick r:id="rId2"/>
+              </a:rPr>
+              <a:t>https://github.com/hoaquocphan/face_dectection</a:t>
+            </a:r>
+            <a:r>
+              <a:rPr lang="en-US" smtClean="0">
+                <a:latin typeface="Times New Roman" panose="02020603050405020304" pitchFamily="18" charset="0"/>
+                <a:cs typeface="Times New Roman" panose="02020603050405020304" pitchFamily="18" charset="0"/>
+              </a:rPr>
+              <a:t> </a:t>
+            </a:r>
+          </a:p>
+          <a:p>
+            <a:pPr marL="342900" indent="-342900" algn="l">
+              <a:buFont typeface="Arial" panose="020B0604020202020204" pitchFamily="34" charset="0"/>
+              <a:buChar char="•"/>
+            </a:pPr>
+            <a:r>
+              <a:rPr lang="en-US" smtClean="0">
+                <a:latin typeface="Times New Roman" panose="02020603050405020304" pitchFamily="18" charset="0"/>
+                <a:cs typeface="Times New Roman" panose="02020603050405020304" pitchFamily="18" charset="0"/>
+              </a:rPr>
+              <a:t>Run prepare_data.py to prepare data (number of classes = 10)</a:t>
             </a:r>
           </a:p>
           <a:p>
@@ -4153,14 +4546,379 @@
                 <a:latin typeface="Times New Roman" panose="02020603050405020304" pitchFamily="18" charset="0"/>
                 <a:cs typeface="Times New Roman" panose="02020603050405020304" pitchFamily="18" charset="0"/>
               </a:rPr>
-              <a:t>ython3 </a:t>
+              <a:t>ython3 prepare_data.py </a:t>
             </a:r>
             <a:r>
               <a:rPr lang="en-US" smtClean="0">
                 <a:latin typeface="Times New Roman" panose="02020603050405020304" pitchFamily="18" charset="0"/>
                 <a:cs typeface="Times New Roman" panose="02020603050405020304" pitchFamily="18" charset="0"/>
               </a:rPr>
-              <a:t>train_model.py </a:t>
+              <a:t>--n </a:t>
+            </a:r>
+            <a:r>
+              <a:rPr lang="en-US" smtClean="0">
+                <a:latin typeface="Times New Roman" panose="02020603050405020304" pitchFamily="18" charset="0"/>
+                <a:cs typeface="Times New Roman" panose="02020603050405020304" pitchFamily="18" charset="0"/>
+              </a:rPr>
+              <a:t>10 </a:t>
+            </a:r>
+          </a:p>
+          <a:p>
+            <a:pPr marL="800100" lvl="1" indent="-342900" algn="l">
+              <a:buFont typeface="Wingdings" panose="05000000000000000000" pitchFamily="2" charset="2"/>
+              <a:buChar char="Ø"/>
+            </a:pPr>
+            <a:r>
+              <a:rPr lang="en-US" smtClean="0">
+                <a:latin typeface="Times New Roman" panose="02020603050405020304" pitchFamily="18" charset="0"/>
+                <a:cs typeface="Times New Roman" panose="02020603050405020304" pitchFamily="18" charset="0"/>
+              </a:rPr>
+              <a:t>Output of above command: the data of first 10 classes will be devided to 3 folder as below: </a:t>
+            </a:r>
+            <a:endParaRPr lang="en-US">
+              <a:latin typeface="Times New Roman" panose="02020603050405020304" pitchFamily="18" charset="0"/>
+              <a:cs typeface="Times New Roman" panose="02020603050405020304" pitchFamily="18" charset="0"/>
+            </a:endParaRPr>
+          </a:p>
+        </p:txBody>
+      </p:sp>
+      <p:pic>
+        <p:nvPicPr>
+          <p:cNvPr id="2" name="Picture 1"/>
+          <p:cNvPicPr>
+            <a:picLocks noChangeAspect="1"/>
+          </p:cNvPicPr>
+          <p:nvPr/>
+        </p:nvPicPr>
+        <p:blipFill>
+          <a:blip r:embed="rId3"/>
+          <a:stretch>
+            <a:fillRect/>
+          </a:stretch>
+        </p:blipFill>
+        <p:spPr>
+          <a:xfrm>
+            <a:off x="958881" y="3517110"/>
+            <a:ext cx="10262812" cy="1211710"/>
+          </a:xfrm>
+          <a:prstGeom prst="rect">
+            <a:avLst/>
+          </a:prstGeom>
+        </p:spPr>
+      </p:pic>
+      <p:sp>
+        <p:nvSpPr>
+          <p:cNvPr id="4" name="Titel 1"/>
+          <p:cNvSpPr txBox="1">
+            <a:spLocks/>
+          </p:cNvSpPr>
+          <p:nvPr/>
+        </p:nvSpPr>
+        <p:spPr>
+          <a:xfrm>
+            <a:off x="467999" y="423081"/>
+            <a:ext cx="11244575" cy="629655"/>
+          </a:xfrm>
+          <a:prstGeom prst="rect">
+            <a:avLst/>
+          </a:prstGeom>
+          <a:solidFill>
+            <a:schemeClr val="accent1">
+              <a:lumMod val="75000"/>
+            </a:schemeClr>
+          </a:solidFill>
+        </p:spPr>
+        <p:txBody>
+          <a:bodyPr vert="horz" lIns="91440" tIns="45720" rIns="91440" bIns="45720" rtlCol="0" anchor="b">
+            <a:normAutofit fontScale="77500" lnSpcReduction="20000"/>
+          </a:bodyPr>
+          <a:lstStyle>
+            <a:lvl1pPr algn="ctr" defTabSz="914400" rtl="0" eaLnBrk="1" latinLnBrk="0" hangingPunct="1">
+              <a:lnSpc>
+                <a:spcPct val="90000"/>
+              </a:lnSpc>
+              <a:spcBef>
+                <a:spcPct val="0"/>
+              </a:spcBef>
+              <a:buNone/>
+              <a:defRPr sz="6000" kern="1200">
+                <a:solidFill>
+                  <a:schemeClr val="tx1"/>
+                </a:solidFill>
+                <a:latin typeface="+mj-lt"/>
+                <a:ea typeface="+mj-ea"/>
+                <a:cs typeface="+mj-cs"/>
+              </a:defRPr>
+            </a:lvl1pPr>
+          </a:lstStyle>
+          <a:p>
+            <a:pPr algn="l"/>
+            <a:r>
+              <a:rPr lang="en-US" b="1" cap="all" smtClean="0">
+                <a:solidFill>
+                  <a:schemeClr val="bg1"/>
+                </a:solidFill>
+                <a:latin typeface="Times New Roman" panose="02020603050405020304" pitchFamily="18" charset="0"/>
+                <a:cs typeface="Times New Roman" panose="02020603050405020304" pitchFamily="18" charset="0"/>
+              </a:rPr>
+              <a:t>Prepare data</a:t>
+            </a:r>
+            <a:endParaRPr lang="en-US" b="1" dirty="0">
+              <a:solidFill>
+                <a:schemeClr val="bg1"/>
+              </a:solidFill>
+              <a:latin typeface="Times New Roman" panose="02020603050405020304" pitchFamily="18" charset="0"/>
+              <a:cs typeface="Times New Roman" panose="02020603050405020304" pitchFamily="18" charset="0"/>
+            </a:endParaRPr>
+          </a:p>
+        </p:txBody>
+      </p:sp>
+    </p:spTree>
+    <p:extLst>
+      <p:ext uri="{BB962C8B-B14F-4D97-AF65-F5344CB8AC3E}">
+        <p14:creationId xmlns:p14="http://schemas.microsoft.com/office/powerpoint/2010/main" val="3415024831"/>
+      </p:ext>
+    </p:extLst>
+  </p:cSld>
+  <p:clrMapOvr>
+    <a:masterClrMapping/>
+  </p:clrMapOvr>
+</p:sld>
+</file>
+
+<file path=ppt/slides/slide5.xml><?xml version="1.0" encoding="utf-8"?>
+<p:sld xmlns:a="http://schemas.openxmlformats.org/drawingml/2006/main" xmlns:r="http://schemas.openxmlformats.org/officeDocument/2006/relationships" xmlns:p="http://schemas.openxmlformats.org/presentationml/2006/main">
+  <p:cSld>
+    <p:spTree>
+      <p:nvGrpSpPr>
+        <p:cNvPr id="1" name=""/>
+        <p:cNvGrpSpPr/>
+        <p:nvPr/>
+      </p:nvGrpSpPr>
+      <p:grpSpPr>
+        <a:xfrm>
+          <a:off x="0" y="0"/>
+          <a:ext cx="0" cy="0"/>
+          <a:chOff x="0" y="0"/>
+          <a:chExt cx="0" cy="0"/>
+        </a:xfrm>
+      </p:grpSpPr>
+      <p:sp>
+        <p:nvSpPr>
+          <p:cNvPr id="6" name="Inhaltsplatzhalter 3"/>
+          <p:cNvSpPr txBox="1">
+            <a:spLocks/>
+          </p:cNvSpPr>
+          <p:nvPr/>
+        </p:nvSpPr>
+        <p:spPr>
+          <a:xfrm>
+            <a:off x="468000" y="1424991"/>
+            <a:ext cx="11244574" cy="4184239"/>
+          </a:xfrm>
+          <a:prstGeom prst="rect">
+            <a:avLst/>
+          </a:prstGeom>
+        </p:spPr>
+        <p:txBody>
+          <a:bodyPr vert="horz" lIns="91440" tIns="45720" rIns="91440" bIns="45720" rtlCol="0">
+            <a:normAutofit/>
+          </a:bodyPr>
+          <a:lstStyle>
+            <a:lvl1pPr marL="0" indent="0" algn="ctr" defTabSz="914400" rtl="0" eaLnBrk="1" latinLnBrk="0" hangingPunct="1">
+              <a:lnSpc>
+                <a:spcPct val="90000"/>
+              </a:lnSpc>
+              <a:spcBef>
+                <a:spcPts val="1000"/>
+              </a:spcBef>
+              <a:buFont typeface="Arial" panose="020B0604020202020204" pitchFamily="34" charset="0"/>
+              <a:buNone/>
+              <a:defRPr sz="2400" kern="1200">
+                <a:solidFill>
+                  <a:schemeClr val="tx1"/>
+                </a:solidFill>
+                <a:latin typeface="+mn-lt"/>
+                <a:ea typeface="+mn-ea"/>
+                <a:cs typeface="+mn-cs"/>
+              </a:defRPr>
+            </a:lvl1pPr>
+            <a:lvl2pPr marL="457200" indent="0" algn="ctr" defTabSz="914400" rtl="0" eaLnBrk="1" latinLnBrk="0" hangingPunct="1">
+              <a:lnSpc>
+                <a:spcPct val="90000"/>
+              </a:lnSpc>
+              <a:spcBef>
+                <a:spcPts val="500"/>
+              </a:spcBef>
+              <a:buFont typeface="Arial" panose="020B0604020202020204" pitchFamily="34" charset="0"/>
+              <a:buNone/>
+              <a:defRPr sz="2000" kern="1200">
+                <a:solidFill>
+                  <a:schemeClr val="tx1"/>
+                </a:solidFill>
+                <a:latin typeface="+mn-lt"/>
+                <a:ea typeface="+mn-ea"/>
+                <a:cs typeface="+mn-cs"/>
+              </a:defRPr>
+            </a:lvl2pPr>
+            <a:lvl3pPr marL="914400" indent="0" algn="ctr" defTabSz="914400" rtl="0" eaLnBrk="1" latinLnBrk="0" hangingPunct="1">
+              <a:lnSpc>
+                <a:spcPct val="90000"/>
+              </a:lnSpc>
+              <a:spcBef>
+                <a:spcPts val="500"/>
+              </a:spcBef>
+              <a:buFont typeface="Arial" panose="020B0604020202020204" pitchFamily="34" charset="0"/>
+              <a:buNone/>
+              <a:defRPr sz="1800" kern="1200">
+                <a:solidFill>
+                  <a:schemeClr val="tx1"/>
+                </a:solidFill>
+                <a:latin typeface="+mn-lt"/>
+                <a:ea typeface="+mn-ea"/>
+                <a:cs typeface="+mn-cs"/>
+              </a:defRPr>
+            </a:lvl3pPr>
+            <a:lvl4pPr marL="1371600" indent="0" algn="ctr" defTabSz="914400" rtl="0" eaLnBrk="1" latinLnBrk="0" hangingPunct="1">
+              <a:lnSpc>
+                <a:spcPct val="90000"/>
+              </a:lnSpc>
+              <a:spcBef>
+                <a:spcPts val="500"/>
+              </a:spcBef>
+              <a:buFont typeface="Arial" panose="020B0604020202020204" pitchFamily="34" charset="0"/>
+              <a:buNone/>
+              <a:defRPr sz="1600" kern="1200">
+                <a:solidFill>
+                  <a:schemeClr val="tx1"/>
+                </a:solidFill>
+                <a:latin typeface="+mn-lt"/>
+                <a:ea typeface="+mn-ea"/>
+                <a:cs typeface="+mn-cs"/>
+              </a:defRPr>
+            </a:lvl4pPr>
+            <a:lvl5pPr marL="1828800" indent="0" algn="ctr" defTabSz="914400" rtl="0" eaLnBrk="1" latinLnBrk="0" hangingPunct="1">
+              <a:lnSpc>
+                <a:spcPct val="90000"/>
+              </a:lnSpc>
+              <a:spcBef>
+                <a:spcPts val="500"/>
+              </a:spcBef>
+              <a:buFont typeface="Arial" panose="020B0604020202020204" pitchFamily="34" charset="0"/>
+              <a:buNone/>
+              <a:defRPr sz="1600" kern="1200">
+                <a:solidFill>
+                  <a:schemeClr val="tx1"/>
+                </a:solidFill>
+                <a:latin typeface="+mn-lt"/>
+                <a:ea typeface="+mn-ea"/>
+                <a:cs typeface="+mn-cs"/>
+              </a:defRPr>
+            </a:lvl5pPr>
+            <a:lvl6pPr marL="2286000" indent="0" algn="ctr" defTabSz="914400" rtl="0" eaLnBrk="1" latinLnBrk="0" hangingPunct="1">
+              <a:lnSpc>
+                <a:spcPct val="90000"/>
+              </a:lnSpc>
+              <a:spcBef>
+                <a:spcPts val="500"/>
+              </a:spcBef>
+              <a:buFont typeface="Arial" panose="020B0604020202020204" pitchFamily="34" charset="0"/>
+              <a:buNone/>
+              <a:defRPr sz="1600" kern="1200">
+                <a:solidFill>
+                  <a:schemeClr val="tx1"/>
+                </a:solidFill>
+                <a:latin typeface="+mn-lt"/>
+                <a:ea typeface="+mn-ea"/>
+                <a:cs typeface="+mn-cs"/>
+              </a:defRPr>
+            </a:lvl6pPr>
+            <a:lvl7pPr marL="2743200" indent="0" algn="ctr" defTabSz="914400" rtl="0" eaLnBrk="1" latinLnBrk="0" hangingPunct="1">
+              <a:lnSpc>
+                <a:spcPct val="90000"/>
+              </a:lnSpc>
+              <a:spcBef>
+                <a:spcPts val="500"/>
+              </a:spcBef>
+              <a:buFont typeface="Arial" panose="020B0604020202020204" pitchFamily="34" charset="0"/>
+              <a:buNone/>
+              <a:defRPr sz="1600" kern="1200">
+                <a:solidFill>
+                  <a:schemeClr val="tx1"/>
+                </a:solidFill>
+                <a:latin typeface="+mn-lt"/>
+                <a:ea typeface="+mn-ea"/>
+                <a:cs typeface="+mn-cs"/>
+              </a:defRPr>
+            </a:lvl7pPr>
+            <a:lvl8pPr marL="3200400" indent="0" algn="ctr" defTabSz="914400" rtl="0" eaLnBrk="1" latinLnBrk="0" hangingPunct="1">
+              <a:lnSpc>
+                <a:spcPct val="90000"/>
+              </a:lnSpc>
+              <a:spcBef>
+                <a:spcPts val="500"/>
+              </a:spcBef>
+              <a:buFont typeface="Arial" panose="020B0604020202020204" pitchFamily="34" charset="0"/>
+              <a:buNone/>
+              <a:defRPr sz="1600" kern="1200">
+                <a:solidFill>
+                  <a:schemeClr val="tx1"/>
+                </a:solidFill>
+                <a:latin typeface="+mn-lt"/>
+                <a:ea typeface="+mn-ea"/>
+                <a:cs typeface="+mn-cs"/>
+              </a:defRPr>
+            </a:lvl8pPr>
+            <a:lvl9pPr marL="3657600" indent="0" algn="ctr" defTabSz="914400" rtl="0" eaLnBrk="1" latinLnBrk="0" hangingPunct="1">
+              <a:lnSpc>
+                <a:spcPct val="90000"/>
+              </a:lnSpc>
+              <a:spcBef>
+                <a:spcPts val="500"/>
+              </a:spcBef>
+              <a:buFont typeface="Arial" panose="020B0604020202020204" pitchFamily="34" charset="0"/>
+              <a:buNone/>
+              <a:defRPr sz="1600" kern="1200">
+                <a:solidFill>
+                  <a:schemeClr val="tx1"/>
+                </a:solidFill>
+                <a:latin typeface="+mn-lt"/>
+                <a:ea typeface="+mn-ea"/>
+                <a:cs typeface="+mn-cs"/>
+              </a:defRPr>
+            </a:lvl9pPr>
+          </a:lstStyle>
+          <a:p>
+            <a:pPr marL="342900" indent="-342900" algn="l">
+              <a:buFont typeface="Arial" panose="020B0604020202020204" pitchFamily="34" charset="0"/>
+              <a:buChar char="•"/>
+            </a:pPr>
+            <a:r>
+              <a:rPr lang="en-US" smtClean="0">
+                <a:latin typeface="Times New Roman" panose="02020603050405020304" pitchFamily="18" charset="0"/>
+                <a:cs typeface="Times New Roman" panose="02020603050405020304" pitchFamily="18" charset="0"/>
+              </a:rPr>
+              <a:t>Run train_model.py to train model (number of classes = 10)</a:t>
+            </a:r>
+          </a:p>
+          <a:p>
+            <a:pPr marL="800100" lvl="1" indent="-342900" algn="l">
+              <a:buFont typeface="Wingdings" panose="05000000000000000000" pitchFamily="2" charset="2"/>
+              <a:buChar char="Ø"/>
+            </a:pPr>
+            <a:r>
+              <a:rPr lang="en-US">
+                <a:latin typeface="Times New Roman" panose="02020603050405020304" pitchFamily="18" charset="0"/>
+                <a:cs typeface="Times New Roman" panose="02020603050405020304" pitchFamily="18" charset="0"/>
+              </a:rPr>
+              <a:t>p</a:t>
+            </a:r>
+            <a:r>
+              <a:rPr lang="en-US" smtClean="0">
+                <a:latin typeface="Times New Roman" panose="02020603050405020304" pitchFamily="18" charset="0"/>
+                <a:cs typeface="Times New Roman" panose="02020603050405020304" pitchFamily="18" charset="0"/>
+              </a:rPr>
+              <a:t>ython3 train_model.py </a:t>
             </a:r>
           </a:p>
           <a:p>
@@ -4289,314 +5047,77 @@
           </a:prstGeom>
         </p:spPr>
       </p:pic>
+      <p:sp>
+        <p:nvSpPr>
+          <p:cNvPr id="5" name="Titel 1"/>
+          <p:cNvSpPr txBox="1">
+            <a:spLocks/>
+          </p:cNvSpPr>
+          <p:nvPr/>
+        </p:nvSpPr>
+        <p:spPr>
+          <a:xfrm>
+            <a:off x="467999" y="423081"/>
+            <a:ext cx="11244575" cy="629655"/>
+          </a:xfrm>
+          <a:prstGeom prst="rect">
+            <a:avLst/>
+          </a:prstGeom>
+          <a:solidFill>
+            <a:schemeClr val="accent1">
+              <a:lumMod val="75000"/>
+            </a:schemeClr>
+          </a:solidFill>
+        </p:spPr>
+        <p:txBody>
+          <a:bodyPr vert="horz" lIns="91440" tIns="45720" rIns="91440" bIns="45720" rtlCol="0" anchor="b">
+            <a:normAutofit fontScale="77500" lnSpcReduction="20000"/>
+          </a:bodyPr>
+          <a:lstStyle>
+            <a:lvl1pPr algn="ctr" defTabSz="914400" rtl="0" eaLnBrk="1" latinLnBrk="0" hangingPunct="1">
+              <a:lnSpc>
+                <a:spcPct val="90000"/>
+              </a:lnSpc>
+              <a:spcBef>
+                <a:spcPct val="0"/>
+              </a:spcBef>
+              <a:buNone/>
+              <a:defRPr sz="6000" kern="1200">
+                <a:solidFill>
+                  <a:schemeClr val="tx1"/>
+                </a:solidFill>
+                <a:latin typeface="+mj-lt"/>
+                <a:ea typeface="+mj-ea"/>
+                <a:cs typeface="+mj-cs"/>
+              </a:defRPr>
+            </a:lvl1pPr>
+          </a:lstStyle>
+          <a:p>
+            <a:pPr algn="l"/>
+            <a:r>
+              <a:rPr lang="en-US" b="1" cap="all" smtClean="0">
+                <a:solidFill>
+                  <a:schemeClr val="bg1"/>
+                </a:solidFill>
+                <a:latin typeface="Times New Roman" panose="02020603050405020304" pitchFamily="18" charset="0"/>
+                <a:cs typeface="Times New Roman" panose="02020603050405020304" pitchFamily="18" charset="0"/>
+              </a:rPr>
+              <a:t>Model 1</a:t>
+            </a:r>
+            <a:endParaRPr lang="en-US" b="1" dirty="0">
+              <a:solidFill>
+                <a:schemeClr val="bg1"/>
+              </a:solidFill>
+              <a:latin typeface="Times New Roman" panose="02020603050405020304" pitchFamily="18" charset="0"/>
+              <a:cs typeface="Times New Roman" panose="02020603050405020304" pitchFamily="18" charset="0"/>
+            </a:endParaRPr>
+          </a:p>
+        </p:txBody>
+      </p:sp>
     </p:spTree>
     <p:extLst>
       <p:ext uri="{BB962C8B-B14F-4D97-AF65-F5344CB8AC3E}">
         <p14:creationId xmlns:p14="http://schemas.microsoft.com/office/powerpoint/2010/main" val="993591278"/>
-      </p:ext>
-    </p:extLst>
-  </p:cSld>
-  <p:clrMapOvr>
-    <a:masterClrMapping/>
-  </p:clrMapOvr>
-</p:sld>
-</file>
-
-<file path=ppt/slides/slide5.xml><?xml version="1.0" encoding="utf-8"?>
-<p:sld xmlns:a="http://schemas.openxmlformats.org/drawingml/2006/main" xmlns:r="http://schemas.openxmlformats.org/officeDocument/2006/relationships" xmlns:p="http://schemas.openxmlformats.org/presentationml/2006/main">
-  <p:cSld>
-    <p:spTree>
-      <p:nvGrpSpPr>
-        <p:cNvPr id="1" name=""/>
-        <p:cNvGrpSpPr/>
-        <p:nvPr/>
-      </p:nvGrpSpPr>
-      <p:grpSpPr>
-        <a:xfrm>
-          <a:off x="0" y="0"/>
-          <a:ext cx="0" cy="0"/>
-          <a:chOff x="0" y="0"/>
-          <a:chExt cx="0" cy="0"/>
-        </a:xfrm>
-      </p:grpSpPr>
-      <p:sp>
-        <p:nvSpPr>
-          <p:cNvPr id="6" name="Inhaltsplatzhalter 3"/>
-          <p:cNvSpPr txBox="1">
-            <a:spLocks/>
-          </p:cNvSpPr>
-          <p:nvPr/>
-        </p:nvSpPr>
-        <p:spPr>
-          <a:xfrm>
-            <a:off x="468000" y="1424991"/>
-            <a:ext cx="11244574" cy="4184239"/>
-          </a:xfrm>
-          <a:prstGeom prst="rect">
-            <a:avLst/>
-          </a:prstGeom>
-        </p:spPr>
-        <p:txBody>
-          <a:bodyPr vert="horz" lIns="91440" tIns="45720" rIns="91440" bIns="45720" rtlCol="0">
-            <a:normAutofit/>
-          </a:bodyPr>
-          <a:lstStyle>
-            <a:lvl1pPr marL="0" indent="0" algn="ctr" defTabSz="914400" rtl="0" eaLnBrk="1" latinLnBrk="0" hangingPunct="1">
-              <a:lnSpc>
-                <a:spcPct val="90000"/>
-              </a:lnSpc>
-              <a:spcBef>
-                <a:spcPts val="1000"/>
-              </a:spcBef>
-              <a:buFont typeface="Arial" panose="020B0604020202020204" pitchFamily="34" charset="0"/>
-              <a:buNone/>
-              <a:defRPr sz="2400" kern="1200">
-                <a:solidFill>
-                  <a:schemeClr val="tx1"/>
-                </a:solidFill>
-                <a:latin typeface="+mn-lt"/>
-                <a:ea typeface="+mn-ea"/>
-                <a:cs typeface="+mn-cs"/>
-              </a:defRPr>
-            </a:lvl1pPr>
-            <a:lvl2pPr marL="457200" indent="0" algn="ctr" defTabSz="914400" rtl="0" eaLnBrk="1" latinLnBrk="0" hangingPunct="1">
-              <a:lnSpc>
-                <a:spcPct val="90000"/>
-              </a:lnSpc>
-              <a:spcBef>
-                <a:spcPts val="500"/>
-              </a:spcBef>
-              <a:buFont typeface="Arial" panose="020B0604020202020204" pitchFamily="34" charset="0"/>
-              <a:buNone/>
-              <a:defRPr sz="2000" kern="1200">
-                <a:solidFill>
-                  <a:schemeClr val="tx1"/>
-                </a:solidFill>
-                <a:latin typeface="+mn-lt"/>
-                <a:ea typeface="+mn-ea"/>
-                <a:cs typeface="+mn-cs"/>
-              </a:defRPr>
-            </a:lvl2pPr>
-            <a:lvl3pPr marL="914400" indent="0" algn="ctr" defTabSz="914400" rtl="0" eaLnBrk="1" latinLnBrk="0" hangingPunct="1">
-              <a:lnSpc>
-                <a:spcPct val="90000"/>
-              </a:lnSpc>
-              <a:spcBef>
-                <a:spcPts val="500"/>
-              </a:spcBef>
-              <a:buFont typeface="Arial" panose="020B0604020202020204" pitchFamily="34" charset="0"/>
-              <a:buNone/>
-              <a:defRPr sz="1800" kern="1200">
-                <a:solidFill>
-                  <a:schemeClr val="tx1"/>
-                </a:solidFill>
-                <a:latin typeface="+mn-lt"/>
-                <a:ea typeface="+mn-ea"/>
-                <a:cs typeface="+mn-cs"/>
-              </a:defRPr>
-            </a:lvl3pPr>
-            <a:lvl4pPr marL="1371600" indent="0" algn="ctr" defTabSz="914400" rtl="0" eaLnBrk="1" latinLnBrk="0" hangingPunct="1">
-              <a:lnSpc>
-                <a:spcPct val="90000"/>
-              </a:lnSpc>
-              <a:spcBef>
-                <a:spcPts val="500"/>
-              </a:spcBef>
-              <a:buFont typeface="Arial" panose="020B0604020202020204" pitchFamily="34" charset="0"/>
-              <a:buNone/>
-              <a:defRPr sz="1600" kern="1200">
-                <a:solidFill>
-                  <a:schemeClr val="tx1"/>
-                </a:solidFill>
-                <a:latin typeface="+mn-lt"/>
-                <a:ea typeface="+mn-ea"/>
-                <a:cs typeface="+mn-cs"/>
-              </a:defRPr>
-            </a:lvl4pPr>
-            <a:lvl5pPr marL="1828800" indent="0" algn="ctr" defTabSz="914400" rtl="0" eaLnBrk="1" latinLnBrk="0" hangingPunct="1">
-              <a:lnSpc>
-                <a:spcPct val="90000"/>
-              </a:lnSpc>
-              <a:spcBef>
-                <a:spcPts val="500"/>
-              </a:spcBef>
-              <a:buFont typeface="Arial" panose="020B0604020202020204" pitchFamily="34" charset="0"/>
-              <a:buNone/>
-              <a:defRPr sz="1600" kern="1200">
-                <a:solidFill>
-                  <a:schemeClr val="tx1"/>
-                </a:solidFill>
-                <a:latin typeface="+mn-lt"/>
-                <a:ea typeface="+mn-ea"/>
-                <a:cs typeface="+mn-cs"/>
-              </a:defRPr>
-            </a:lvl5pPr>
-            <a:lvl6pPr marL="2286000" indent="0" algn="ctr" defTabSz="914400" rtl="0" eaLnBrk="1" latinLnBrk="0" hangingPunct="1">
-              <a:lnSpc>
-                <a:spcPct val="90000"/>
-              </a:lnSpc>
-              <a:spcBef>
-                <a:spcPts val="500"/>
-              </a:spcBef>
-              <a:buFont typeface="Arial" panose="020B0604020202020204" pitchFamily="34" charset="0"/>
-              <a:buNone/>
-              <a:defRPr sz="1600" kern="1200">
-                <a:solidFill>
-                  <a:schemeClr val="tx1"/>
-                </a:solidFill>
-                <a:latin typeface="+mn-lt"/>
-                <a:ea typeface="+mn-ea"/>
-                <a:cs typeface="+mn-cs"/>
-              </a:defRPr>
-            </a:lvl6pPr>
-            <a:lvl7pPr marL="2743200" indent="0" algn="ctr" defTabSz="914400" rtl="0" eaLnBrk="1" latinLnBrk="0" hangingPunct="1">
-              <a:lnSpc>
-                <a:spcPct val="90000"/>
-              </a:lnSpc>
-              <a:spcBef>
-                <a:spcPts val="500"/>
-              </a:spcBef>
-              <a:buFont typeface="Arial" panose="020B0604020202020204" pitchFamily="34" charset="0"/>
-              <a:buNone/>
-              <a:defRPr sz="1600" kern="1200">
-                <a:solidFill>
-                  <a:schemeClr val="tx1"/>
-                </a:solidFill>
-                <a:latin typeface="+mn-lt"/>
-                <a:ea typeface="+mn-ea"/>
-                <a:cs typeface="+mn-cs"/>
-              </a:defRPr>
-            </a:lvl7pPr>
-            <a:lvl8pPr marL="3200400" indent="0" algn="ctr" defTabSz="914400" rtl="0" eaLnBrk="1" latinLnBrk="0" hangingPunct="1">
-              <a:lnSpc>
-                <a:spcPct val="90000"/>
-              </a:lnSpc>
-              <a:spcBef>
-                <a:spcPts val="500"/>
-              </a:spcBef>
-              <a:buFont typeface="Arial" panose="020B0604020202020204" pitchFamily="34" charset="0"/>
-              <a:buNone/>
-              <a:defRPr sz="1600" kern="1200">
-                <a:solidFill>
-                  <a:schemeClr val="tx1"/>
-                </a:solidFill>
-                <a:latin typeface="+mn-lt"/>
-                <a:ea typeface="+mn-ea"/>
-                <a:cs typeface="+mn-cs"/>
-              </a:defRPr>
-            </a:lvl8pPr>
-            <a:lvl9pPr marL="3657600" indent="0" algn="ctr" defTabSz="914400" rtl="0" eaLnBrk="1" latinLnBrk="0" hangingPunct="1">
-              <a:lnSpc>
-                <a:spcPct val="90000"/>
-              </a:lnSpc>
-              <a:spcBef>
-                <a:spcPts val="500"/>
-              </a:spcBef>
-              <a:buFont typeface="Arial" panose="020B0604020202020204" pitchFamily="34" charset="0"/>
-              <a:buNone/>
-              <a:defRPr sz="1600" kern="1200">
-                <a:solidFill>
-                  <a:schemeClr val="tx1"/>
-                </a:solidFill>
-                <a:latin typeface="+mn-lt"/>
-                <a:ea typeface="+mn-ea"/>
-                <a:cs typeface="+mn-cs"/>
-              </a:defRPr>
-            </a:lvl9pPr>
-          </a:lstStyle>
-          <a:p>
-            <a:pPr marL="342900" indent="-342900" algn="l">
-              <a:buFont typeface="Arial" panose="020B0604020202020204" pitchFamily="34" charset="0"/>
-              <a:buChar char="•"/>
-            </a:pPr>
-            <a:r>
-              <a:rPr lang="en-US" smtClean="0">
-                <a:latin typeface="Times New Roman" panose="02020603050405020304" pitchFamily="18" charset="0"/>
-                <a:cs typeface="Times New Roman" panose="02020603050405020304" pitchFamily="18" charset="0"/>
-              </a:rPr>
-              <a:t>Run test_model.py to test model with the test data folder (number of classes = 10)</a:t>
-            </a:r>
-          </a:p>
-          <a:p>
-            <a:pPr marL="800100" lvl="1" indent="-342900" algn="l">
-              <a:buFont typeface="Wingdings" panose="05000000000000000000" pitchFamily="2" charset="2"/>
-              <a:buChar char="Ø"/>
-            </a:pPr>
-            <a:r>
-              <a:rPr lang="en-US">
-                <a:latin typeface="Times New Roman" panose="02020603050405020304" pitchFamily="18" charset="0"/>
-                <a:cs typeface="Times New Roman" panose="02020603050405020304" pitchFamily="18" charset="0"/>
-              </a:rPr>
-              <a:t>p</a:t>
-            </a:r>
-            <a:r>
-              <a:rPr lang="en-US" smtClean="0">
-                <a:latin typeface="Times New Roman" panose="02020603050405020304" pitchFamily="18" charset="0"/>
-                <a:cs typeface="Times New Roman" panose="02020603050405020304" pitchFamily="18" charset="0"/>
-              </a:rPr>
-              <a:t>ython3 </a:t>
-            </a:r>
-            <a:r>
-              <a:rPr lang="en-US" smtClean="0">
-                <a:latin typeface="Times New Roman" panose="02020603050405020304" pitchFamily="18" charset="0"/>
-                <a:cs typeface="Times New Roman" panose="02020603050405020304" pitchFamily="18" charset="0"/>
-              </a:rPr>
-              <a:t>test_model.py </a:t>
-            </a:r>
-          </a:p>
-          <a:p>
-            <a:pPr marL="800100" lvl="1" indent="-342900" algn="l">
-              <a:buFont typeface="Wingdings" panose="05000000000000000000" pitchFamily="2" charset="2"/>
-              <a:buChar char="Ø"/>
-            </a:pPr>
-            <a:r>
-              <a:rPr lang="en-US" smtClean="0">
-                <a:latin typeface="Times New Roman" panose="02020603050405020304" pitchFamily="18" charset="0"/>
-                <a:cs typeface="Times New Roman" panose="02020603050405020304" pitchFamily="18" charset="0"/>
-              </a:rPr>
-              <a:t>The result after retest model with test data</a:t>
-            </a:r>
-          </a:p>
-          <a:p>
-            <a:pPr marL="1257300" lvl="2" indent="-342900" algn="l">
-              <a:buFont typeface="Wingdings" panose="05000000000000000000" pitchFamily="2" charset="2"/>
-              <a:buChar char="Ø"/>
-            </a:pPr>
-            <a:endParaRPr lang="en-US">
-              <a:latin typeface="Times New Roman" panose="02020603050405020304" pitchFamily="18" charset="0"/>
-              <a:cs typeface="Times New Roman" panose="02020603050405020304" pitchFamily="18" charset="0"/>
-            </a:endParaRPr>
-          </a:p>
-        </p:txBody>
-      </p:sp>
-      <p:pic>
-        <p:nvPicPr>
-          <p:cNvPr id="2" name="Picture 1"/>
-          <p:cNvPicPr>
-            <a:picLocks noChangeAspect="1"/>
-          </p:cNvPicPr>
-          <p:nvPr/>
-        </p:nvPicPr>
-        <p:blipFill>
-          <a:blip r:embed="rId2"/>
-          <a:stretch>
-            <a:fillRect/>
-          </a:stretch>
-        </p:blipFill>
-        <p:spPr>
-          <a:xfrm>
-            <a:off x="1029217" y="2785336"/>
-            <a:ext cx="8754243" cy="899560"/>
-          </a:xfrm>
-          <a:prstGeom prst="rect">
-            <a:avLst/>
-          </a:prstGeom>
-        </p:spPr>
-      </p:pic>
-    </p:spTree>
-    <p:extLst>
-      <p:ext uri="{BB962C8B-B14F-4D97-AF65-F5344CB8AC3E}">
-        <p14:creationId xmlns:p14="http://schemas.microsoft.com/office/powerpoint/2010/main" val="3460588399"/>
       </p:ext>
     </p:extLst>
   </p:cSld>
@@ -4818,7 +5339,40 @@
                 <a:latin typeface="Times New Roman" panose="02020603050405020304" pitchFamily="18" charset="0"/>
                 <a:cs typeface="Times New Roman" panose="02020603050405020304" pitchFamily="18" charset="0"/>
               </a:rPr>
-              <a:t>Conclusion </a:t>
+              <a:t>Run test_model.py to test model with the test data folder (number of classes = 10)</a:t>
+            </a:r>
+          </a:p>
+          <a:p>
+            <a:pPr marL="800100" lvl="1" indent="-342900" algn="l">
+              <a:buFont typeface="Wingdings" panose="05000000000000000000" pitchFamily="2" charset="2"/>
+              <a:buChar char="Ø"/>
+            </a:pPr>
+            <a:r>
+              <a:rPr lang="en-US">
+                <a:latin typeface="Times New Roman" panose="02020603050405020304" pitchFamily="18" charset="0"/>
+                <a:cs typeface="Times New Roman" panose="02020603050405020304" pitchFamily="18" charset="0"/>
+              </a:rPr>
+              <a:t>p</a:t>
+            </a:r>
+            <a:r>
+              <a:rPr lang="en-US" smtClean="0">
+                <a:latin typeface="Times New Roman" panose="02020603050405020304" pitchFamily="18" charset="0"/>
+                <a:cs typeface="Times New Roman" panose="02020603050405020304" pitchFamily="18" charset="0"/>
+              </a:rPr>
+              <a:t>ython3 test_model.py </a:t>
+            </a:r>
+          </a:p>
+          <a:p>
+            <a:pPr marL="800100" lvl="1" indent="-342900" algn="l">
+              <a:buFont typeface="Wingdings" panose="05000000000000000000" pitchFamily="2" charset="2"/>
+              <a:buChar char="Ø"/>
+            </a:pPr>
+            <a:r>
+              <a:rPr lang="en-US" smtClean="0">
+                <a:latin typeface="Times New Roman" panose="02020603050405020304" pitchFamily="18" charset="0"/>
+                <a:cs typeface="Times New Roman" panose="02020603050405020304" pitchFamily="18" charset="0"/>
+              </a:rPr>
+              <a:t>The result after retest model with test data</a:t>
             </a:r>
           </a:p>
           <a:p>
@@ -4826,39 +5380,6 @@
               <a:buFont typeface="Wingdings" panose="05000000000000000000" pitchFamily="2" charset="2"/>
               <a:buChar char="Ø"/>
             </a:pPr>
-            <a:r>
-              <a:rPr lang="en-US" smtClean="0">
-                <a:latin typeface="Times New Roman" panose="02020603050405020304" pitchFamily="18" charset="0"/>
-                <a:cs typeface="Times New Roman" panose="02020603050405020304" pitchFamily="18" charset="0"/>
-              </a:rPr>
-              <a:t>The accuracy is low (54.55% with validation data and 40% with test data) because of 2 reason:</a:t>
-            </a:r>
-          </a:p>
-          <a:p>
-            <a:pPr marL="1714500" lvl="3" indent="-342900" algn="l">
-              <a:buFont typeface="Wingdings" panose="05000000000000000000" pitchFamily="2" charset="2"/>
-              <a:buChar char="Ø"/>
-            </a:pPr>
-            <a:r>
-              <a:rPr lang="en-US" smtClean="0">
-                <a:latin typeface="Times New Roman" panose="02020603050405020304" pitchFamily="18" charset="0"/>
-                <a:cs typeface="Times New Roman" panose="02020603050405020304" pitchFamily="18" charset="0"/>
-              </a:rPr>
-              <a:t> the train data is small</a:t>
-            </a:r>
-          </a:p>
-          <a:p>
-            <a:pPr marL="1714500" lvl="3" indent="-342900" algn="l">
-              <a:buFont typeface="Wingdings" panose="05000000000000000000" pitchFamily="2" charset="2"/>
-              <a:buChar char="Ø"/>
-            </a:pPr>
-            <a:r>
-              <a:rPr lang="en-US" smtClean="0">
-                <a:latin typeface="Times New Roman" panose="02020603050405020304" pitchFamily="18" charset="0"/>
-                <a:cs typeface="Times New Roman" panose="02020603050405020304" pitchFamily="18" charset="0"/>
-              </a:rPr>
-              <a:t>The structure of model is simple (there are only 2 layers)</a:t>
-            </a:r>
             <a:endParaRPr lang="en-US">
               <a:latin typeface="Times New Roman" panose="02020603050405020304" pitchFamily="18" charset="0"/>
               <a:cs typeface="Times New Roman" panose="02020603050405020304" pitchFamily="18" charset="0"/>
@@ -4866,10 +5387,101 @@
           </a:p>
         </p:txBody>
       </p:sp>
+      <p:pic>
+        <p:nvPicPr>
+          <p:cNvPr id="2" name="Picture 1"/>
+          <p:cNvPicPr>
+            <a:picLocks noChangeAspect="1"/>
+          </p:cNvPicPr>
+          <p:nvPr/>
+        </p:nvPicPr>
+        <p:blipFill>
+          <a:blip r:embed="rId2"/>
+          <a:stretch>
+            <a:fillRect/>
+          </a:stretch>
+        </p:blipFill>
+        <p:spPr>
+          <a:xfrm>
+            <a:off x="1029217" y="2785336"/>
+            <a:ext cx="8754243" cy="899560"/>
+          </a:xfrm>
+          <a:prstGeom prst="rect">
+            <a:avLst/>
+          </a:prstGeom>
+        </p:spPr>
+      </p:pic>
+      <p:sp>
+        <p:nvSpPr>
+          <p:cNvPr id="4" name="Titel 1"/>
+          <p:cNvSpPr txBox="1">
+            <a:spLocks/>
+          </p:cNvSpPr>
+          <p:nvPr/>
+        </p:nvSpPr>
+        <p:spPr>
+          <a:xfrm>
+            <a:off x="467999" y="423081"/>
+            <a:ext cx="11244575" cy="629655"/>
+          </a:xfrm>
+          <a:prstGeom prst="rect">
+            <a:avLst/>
+          </a:prstGeom>
+          <a:solidFill>
+            <a:schemeClr val="accent1">
+              <a:lumMod val="75000"/>
+            </a:schemeClr>
+          </a:solidFill>
+        </p:spPr>
+        <p:txBody>
+          <a:bodyPr vert="horz" lIns="91440" tIns="45720" rIns="91440" bIns="45720" rtlCol="0" anchor="b">
+            <a:normAutofit fontScale="77500" lnSpcReduction="20000"/>
+          </a:bodyPr>
+          <a:lstStyle>
+            <a:lvl1pPr algn="ctr" defTabSz="914400" rtl="0" eaLnBrk="1" latinLnBrk="0" hangingPunct="1">
+              <a:lnSpc>
+                <a:spcPct val="90000"/>
+              </a:lnSpc>
+              <a:spcBef>
+                <a:spcPct val="0"/>
+              </a:spcBef>
+              <a:buNone/>
+              <a:defRPr sz="6000" kern="1200">
+                <a:solidFill>
+                  <a:schemeClr val="tx1"/>
+                </a:solidFill>
+                <a:latin typeface="+mj-lt"/>
+                <a:ea typeface="+mj-ea"/>
+                <a:cs typeface="+mj-cs"/>
+              </a:defRPr>
+            </a:lvl1pPr>
+          </a:lstStyle>
+          <a:p>
+            <a:pPr algn="l"/>
+            <a:r>
+              <a:rPr lang="en-US" b="1" cap="all" smtClean="0">
+                <a:solidFill>
+                  <a:schemeClr val="bg1"/>
+                </a:solidFill>
+                <a:latin typeface="Times New Roman" panose="02020603050405020304" pitchFamily="18" charset="0"/>
+                <a:cs typeface="Times New Roman" panose="02020603050405020304" pitchFamily="18" charset="0"/>
+              </a:rPr>
+              <a:t>Model 1</a:t>
+            </a:r>
+            <a:endParaRPr lang="en-US" b="1" dirty="0">
+              <a:solidFill>
+                <a:schemeClr val="bg1"/>
+              </a:solidFill>
+              <a:latin typeface="Times New Roman" panose="02020603050405020304" pitchFamily="18" charset="0"/>
+              <a:cs typeface="Times New Roman" panose="02020603050405020304" pitchFamily="18" charset="0"/>
+            </a:endParaRPr>
+          </a:p>
+        </p:txBody>
+      </p:sp>
     </p:spTree>
     <p:extLst>
       <p:ext uri="{BB962C8B-B14F-4D97-AF65-F5344CB8AC3E}">
-        <p14:creationId xmlns:p14="http://schemas.microsoft.com/office/powerpoint/2010/main" val="38664646"/>
+        <p14:creationId xmlns:p14="http://schemas.microsoft.com/office/powerpoint/2010/main" val="3460588399"/>
       </p:ext>
     </p:extLst>
   </p:cSld>
@@ -4898,7 +5510,74 @@
       </p:grpSpPr>
       <p:sp>
         <p:nvSpPr>
-          <p:cNvPr id="6" name="Inhaltsplatzhalter 3"/>
+          <p:cNvPr id="4" name="Titel 1"/>
+          <p:cNvSpPr txBox="1">
+            <a:spLocks/>
+          </p:cNvSpPr>
+          <p:nvPr/>
+        </p:nvSpPr>
+        <p:spPr>
+          <a:xfrm>
+            <a:off x="467999" y="423081"/>
+            <a:ext cx="11244575" cy="629655"/>
+          </a:xfrm>
+          <a:prstGeom prst="rect">
+            <a:avLst/>
+          </a:prstGeom>
+          <a:solidFill>
+            <a:schemeClr val="accent1">
+              <a:lumMod val="75000"/>
+            </a:schemeClr>
+          </a:solidFill>
+        </p:spPr>
+        <p:txBody>
+          <a:bodyPr vert="horz" lIns="91440" tIns="45720" rIns="91440" bIns="45720" rtlCol="0" anchor="b">
+            <a:normAutofit fontScale="77500" lnSpcReduction="20000"/>
+          </a:bodyPr>
+          <a:lstStyle>
+            <a:lvl1pPr algn="ctr" defTabSz="914400" rtl="0" eaLnBrk="1" latinLnBrk="0" hangingPunct="1">
+              <a:lnSpc>
+                <a:spcPct val="90000"/>
+              </a:lnSpc>
+              <a:spcBef>
+                <a:spcPct val="0"/>
+              </a:spcBef>
+              <a:buNone/>
+              <a:defRPr sz="6000" kern="1200">
+                <a:solidFill>
+                  <a:schemeClr val="tx1"/>
+                </a:solidFill>
+                <a:latin typeface="+mj-lt"/>
+                <a:ea typeface="+mj-ea"/>
+                <a:cs typeface="+mj-cs"/>
+              </a:defRPr>
+            </a:lvl1pPr>
+          </a:lstStyle>
+          <a:p>
+            <a:pPr algn="l"/>
+            <a:r>
+              <a:rPr lang="en-US" b="1" cap="all" smtClean="0">
+                <a:solidFill>
+                  <a:schemeClr val="bg1"/>
+                </a:solidFill>
+                <a:latin typeface="Times New Roman" panose="02020603050405020304" pitchFamily="18" charset="0"/>
+                <a:cs typeface="Times New Roman" panose="02020603050405020304" pitchFamily="18" charset="0"/>
+              </a:rPr>
+              <a:t>Model 2 (Alexnet structure)</a:t>
+            </a:r>
+            <a:endParaRPr lang="en-US" b="1" dirty="0">
+              <a:solidFill>
+                <a:schemeClr val="bg1"/>
+              </a:solidFill>
+              <a:latin typeface="Times New Roman" panose="02020603050405020304" pitchFamily="18" charset="0"/>
+              <a:cs typeface="Times New Roman" panose="02020603050405020304" pitchFamily="18" charset="0"/>
+            </a:endParaRPr>
+          </a:p>
+        </p:txBody>
+      </p:sp>
+      <p:sp>
+        <p:nvSpPr>
+          <p:cNvPr id="5" name="Inhaltsplatzhalter 3"/>
           <p:cNvSpPr txBox="1">
             <a:spLocks/>
           </p:cNvSpPr>
@@ -5091,7 +5770,100 @@
                 <a:latin typeface="Times New Roman" panose="02020603050405020304" pitchFamily="18" charset="0"/>
                 <a:cs typeface="Times New Roman" panose="02020603050405020304" pitchFamily="18" charset="0"/>
               </a:rPr>
-              <a:t>Reference</a:t>
+              <a:t>Run train_model.py to train model (number of classes = 10)</a:t>
+            </a:r>
+          </a:p>
+          <a:p>
+            <a:pPr marL="800100" lvl="1" indent="-342900" algn="l">
+              <a:buFont typeface="Wingdings" panose="05000000000000000000" pitchFamily="2" charset="2"/>
+              <a:buChar char="Ø"/>
+            </a:pPr>
+            <a:r>
+              <a:rPr lang="en-US">
+                <a:latin typeface="Times New Roman" panose="02020603050405020304" pitchFamily="18" charset="0"/>
+                <a:cs typeface="Times New Roman" panose="02020603050405020304" pitchFamily="18" charset="0"/>
+              </a:rPr>
+              <a:t>python3 </a:t>
+            </a:r>
+            <a:r>
+              <a:rPr lang="en-US" smtClean="0">
+                <a:latin typeface="Times New Roman" panose="02020603050405020304" pitchFamily="18" charset="0"/>
+                <a:cs typeface="Times New Roman" panose="02020603050405020304" pitchFamily="18" charset="0"/>
+              </a:rPr>
+              <a:t>train_model_alexnet.py</a:t>
+            </a:r>
+          </a:p>
+          <a:p>
+            <a:pPr marL="800100" lvl="1" indent="-342900" algn="l">
+              <a:buFont typeface="Wingdings" panose="05000000000000000000" pitchFamily="2" charset="2"/>
+              <a:buChar char="Ø"/>
+            </a:pPr>
+            <a:r>
+              <a:rPr lang="en-US" smtClean="0">
+                <a:latin typeface="Times New Roman" panose="02020603050405020304" pitchFamily="18" charset="0"/>
+                <a:cs typeface="Times New Roman" panose="02020603050405020304" pitchFamily="18" charset="0"/>
+              </a:rPr>
+              <a:t>The </a:t>
+            </a:r>
+            <a:r>
+              <a:rPr lang="en-US" smtClean="0">
+                <a:latin typeface="Times New Roman" panose="02020603050405020304" pitchFamily="18" charset="0"/>
+                <a:cs typeface="Times New Roman" panose="02020603050405020304" pitchFamily="18" charset="0"/>
+              </a:rPr>
+              <a:t>model after training will be save in model folder:</a:t>
+            </a:r>
+          </a:p>
+          <a:p>
+            <a:pPr marL="800100" lvl="1" indent="-342900" algn="l">
+              <a:buFont typeface="Wingdings" panose="05000000000000000000" pitchFamily="2" charset="2"/>
+              <a:buChar char="Ø"/>
+            </a:pPr>
+            <a:endParaRPr lang="en-US">
+              <a:latin typeface="Times New Roman" panose="02020603050405020304" pitchFamily="18" charset="0"/>
+              <a:cs typeface="Times New Roman" panose="02020603050405020304" pitchFamily="18" charset="0"/>
+            </a:endParaRPr>
+          </a:p>
+          <a:p>
+            <a:pPr marL="800100" lvl="1" indent="-342900" algn="l">
+              <a:buFont typeface="Wingdings" panose="05000000000000000000" pitchFamily="2" charset="2"/>
+              <a:buChar char="Ø"/>
+            </a:pPr>
+            <a:endParaRPr lang="en-US" smtClean="0">
+              <a:latin typeface="Times New Roman" panose="02020603050405020304" pitchFamily="18" charset="0"/>
+              <a:cs typeface="Times New Roman" panose="02020603050405020304" pitchFamily="18" charset="0"/>
+            </a:endParaRPr>
+          </a:p>
+          <a:p>
+            <a:pPr marL="800100" lvl="1" indent="-342900" algn="l">
+              <a:buFont typeface="Wingdings" panose="05000000000000000000" pitchFamily="2" charset="2"/>
+              <a:buChar char="Ø"/>
+            </a:pPr>
+            <a:endParaRPr lang="en-US">
+              <a:latin typeface="Times New Roman" panose="02020603050405020304" pitchFamily="18" charset="0"/>
+              <a:cs typeface="Times New Roman" panose="02020603050405020304" pitchFamily="18" charset="0"/>
+            </a:endParaRPr>
+          </a:p>
+          <a:p>
+            <a:pPr marL="800100" lvl="1" indent="-342900" algn="l">
+              <a:buFont typeface="Wingdings" panose="05000000000000000000" pitchFamily="2" charset="2"/>
+              <a:buChar char="Ø"/>
+            </a:pPr>
+            <a:endParaRPr lang="en-US" smtClean="0">
+              <a:latin typeface="Times New Roman" panose="02020603050405020304" pitchFamily="18" charset="0"/>
+              <a:cs typeface="Times New Roman" panose="02020603050405020304" pitchFamily="18" charset="0"/>
+            </a:endParaRPr>
+          </a:p>
+          <a:p>
+            <a:pPr marL="800100" lvl="1" indent="-342900" algn="l">
+              <a:buFont typeface="Wingdings" panose="05000000000000000000" pitchFamily="2" charset="2"/>
+              <a:buChar char="Ø"/>
+            </a:pPr>
+            <a:r>
+              <a:rPr lang="en-US" smtClean="0">
+                <a:latin typeface="Times New Roman" panose="02020603050405020304" pitchFamily="18" charset="0"/>
+                <a:cs typeface="Times New Roman" panose="02020603050405020304" pitchFamily="18" charset="0"/>
+              </a:rPr>
+              <a:t>The result after retest with validation data</a:t>
             </a:r>
           </a:p>
           <a:p>
@@ -5099,21 +5871,334 @@
               <a:buFont typeface="Wingdings" panose="05000000000000000000" pitchFamily="2" charset="2"/>
               <a:buChar char="Ø"/>
             </a:pPr>
-            <a:r>
-              <a:rPr lang="en-US" smtClean="0">
-                <a:latin typeface="Times New Roman" panose="02020603050405020304" pitchFamily="18" charset="0"/>
-                <a:cs typeface="Times New Roman" panose="02020603050405020304" pitchFamily="18" charset="0"/>
-                <a:hlinkClick r:id="rId2"/>
-              </a:rPr>
-              <a:t>https://www.tensorflow.org/tutorials/keras/classification</a:t>
-            </a:r>
+            <a:endParaRPr lang="en-US">
+              <a:latin typeface="Times New Roman" panose="02020603050405020304" pitchFamily="18" charset="0"/>
+              <a:cs typeface="Times New Roman" panose="02020603050405020304" pitchFamily="18" charset="0"/>
+            </a:endParaRPr>
+          </a:p>
+        </p:txBody>
+      </p:sp>
+      <p:pic>
+        <p:nvPicPr>
+          <p:cNvPr id="3" name="Picture 2"/>
+          <p:cNvPicPr>
+            <a:picLocks noChangeAspect="1"/>
+          </p:cNvPicPr>
+          <p:nvPr/>
+        </p:nvPicPr>
+        <p:blipFill>
+          <a:blip r:embed="rId2"/>
+          <a:stretch>
+            <a:fillRect/>
+          </a:stretch>
+        </p:blipFill>
+        <p:spPr>
+          <a:xfrm>
+            <a:off x="950956" y="2437897"/>
+            <a:ext cx="8717481" cy="1045532"/>
+          </a:xfrm>
+          <a:prstGeom prst="rect">
+            <a:avLst/>
+          </a:prstGeom>
+        </p:spPr>
+      </p:pic>
+      <p:pic>
+        <p:nvPicPr>
+          <p:cNvPr id="7" name="Picture 6"/>
+          <p:cNvPicPr>
+            <a:picLocks noChangeAspect="1"/>
+          </p:cNvPicPr>
+          <p:nvPr/>
+        </p:nvPicPr>
+        <p:blipFill>
+          <a:blip r:embed="rId3"/>
+          <a:stretch>
+            <a:fillRect/>
+          </a:stretch>
+        </p:blipFill>
+        <p:spPr>
+          <a:xfrm>
+            <a:off x="1074701" y="4496335"/>
+            <a:ext cx="7215202" cy="728808"/>
+          </a:xfrm>
+          <a:prstGeom prst="rect">
+            <a:avLst/>
+          </a:prstGeom>
+        </p:spPr>
+      </p:pic>
+    </p:spTree>
+    <p:extLst>
+      <p:ext uri="{BB962C8B-B14F-4D97-AF65-F5344CB8AC3E}">
+        <p14:creationId xmlns:p14="http://schemas.microsoft.com/office/powerpoint/2010/main" val="3885466717"/>
+      </p:ext>
+    </p:extLst>
+  </p:cSld>
+  <p:clrMapOvr>
+    <a:masterClrMapping/>
+  </p:clrMapOvr>
+</p:sld>
+</file>
+
+<file path=ppt/slides/slide8.xml><?xml version="1.0" encoding="utf-8"?>
+<p:sld xmlns:a="http://schemas.openxmlformats.org/drawingml/2006/main" xmlns:r="http://schemas.openxmlformats.org/officeDocument/2006/relationships" xmlns:p="http://schemas.openxmlformats.org/presentationml/2006/main">
+  <p:cSld>
+    <p:spTree>
+      <p:nvGrpSpPr>
+        <p:cNvPr id="1" name=""/>
+        <p:cNvGrpSpPr/>
+        <p:nvPr/>
+      </p:nvGrpSpPr>
+      <p:grpSpPr>
+        <a:xfrm>
+          <a:off x="0" y="0"/>
+          <a:ext cx="0" cy="0"/>
+          <a:chOff x="0" y="0"/>
+          <a:chExt cx="0" cy="0"/>
+        </a:xfrm>
+      </p:grpSpPr>
+      <p:sp>
+        <p:nvSpPr>
+          <p:cNvPr id="6" name="Inhaltsplatzhalter 3"/>
+          <p:cNvSpPr txBox="1">
+            <a:spLocks/>
+          </p:cNvSpPr>
+          <p:nvPr/>
+        </p:nvSpPr>
+        <p:spPr>
+          <a:xfrm>
+            <a:off x="468000" y="1424991"/>
+            <a:ext cx="11244574" cy="4184239"/>
+          </a:xfrm>
+          <a:prstGeom prst="rect">
+            <a:avLst/>
+          </a:prstGeom>
+        </p:spPr>
+        <p:txBody>
+          <a:bodyPr vert="horz" lIns="91440" tIns="45720" rIns="91440" bIns="45720" rtlCol="0">
+            <a:normAutofit/>
+          </a:bodyPr>
+          <a:lstStyle>
+            <a:lvl1pPr marL="0" indent="0" algn="ctr" defTabSz="914400" rtl="0" eaLnBrk="1" latinLnBrk="0" hangingPunct="1">
+              <a:lnSpc>
+                <a:spcPct val="90000"/>
+              </a:lnSpc>
+              <a:spcBef>
+                <a:spcPts val="1000"/>
+              </a:spcBef>
+              <a:buFont typeface="Arial" panose="020B0604020202020204" pitchFamily="34" charset="0"/>
+              <a:buNone/>
+              <a:defRPr sz="2400" kern="1200">
+                <a:solidFill>
+                  <a:schemeClr val="tx1"/>
+                </a:solidFill>
+                <a:latin typeface="+mn-lt"/>
+                <a:ea typeface="+mn-ea"/>
+                <a:cs typeface="+mn-cs"/>
+              </a:defRPr>
+            </a:lvl1pPr>
+            <a:lvl2pPr marL="457200" indent="0" algn="ctr" defTabSz="914400" rtl="0" eaLnBrk="1" latinLnBrk="0" hangingPunct="1">
+              <a:lnSpc>
+                <a:spcPct val="90000"/>
+              </a:lnSpc>
+              <a:spcBef>
+                <a:spcPts val="500"/>
+              </a:spcBef>
+              <a:buFont typeface="Arial" panose="020B0604020202020204" pitchFamily="34" charset="0"/>
+              <a:buNone/>
+              <a:defRPr sz="2000" kern="1200">
+                <a:solidFill>
+                  <a:schemeClr val="tx1"/>
+                </a:solidFill>
+                <a:latin typeface="+mn-lt"/>
+                <a:ea typeface="+mn-ea"/>
+                <a:cs typeface="+mn-cs"/>
+              </a:defRPr>
+            </a:lvl2pPr>
+            <a:lvl3pPr marL="914400" indent="0" algn="ctr" defTabSz="914400" rtl="0" eaLnBrk="1" latinLnBrk="0" hangingPunct="1">
+              <a:lnSpc>
+                <a:spcPct val="90000"/>
+              </a:lnSpc>
+              <a:spcBef>
+                <a:spcPts val="500"/>
+              </a:spcBef>
+              <a:buFont typeface="Arial" panose="020B0604020202020204" pitchFamily="34" charset="0"/>
+              <a:buNone/>
+              <a:defRPr sz="1800" kern="1200">
+                <a:solidFill>
+                  <a:schemeClr val="tx1"/>
+                </a:solidFill>
+                <a:latin typeface="+mn-lt"/>
+                <a:ea typeface="+mn-ea"/>
+                <a:cs typeface="+mn-cs"/>
+              </a:defRPr>
+            </a:lvl3pPr>
+            <a:lvl4pPr marL="1371600" indent="0" algn="ctr" defTabSz="914400" rtl="0" eaLnBrk="1" latinLnBrk="0" hangingPunct="1">
+              <a:lnSpc>
+                <a:spcPct val="90000"/>
+              </a:lnSpc>
+              <a:spcBef>
+                <a:spcPts val="500"/>
+              </a:spcBef>
+              <a:buFont typeface="Arial" panose="020B0604020202020204" pitchFamily="34" charset="0"/>
+              <a:buNone/>
+              <a:defRPr sz="1600" kern="1200">
+                <a:solidFill>
+                  <a:schemeClr val="tx1"/>
+                </a:solidFill>
+                <a:latin typeface="+mn-lt"/>
+                <a:ea typeface="+mn-ea"/>
+                <a:cs typeface="+mn-cs"/>
+              </a:defRPr>
+            </a:lvl4pPr>
+            <a:lvl5pPr marL="1828800" indent="0" algn="ctr" defTabSz="914400" rtl="0" eaLnBrk="1" latinLnBrk="0" hangingPunct="1">
+              <a:lnSpc>
+                <a:spcPct val="90000"/>
+              </a:lnSpc>
+              <a:spcBef>
+                <a:spcPts val="500"/>
+              </a:spcBef>
+              <a:buFont typeface="Arial" panose="020B0604020202020204" pitchFamily="34" charset="0"/>
+              <a:buNone/>
+              <a:defRPr sz="1600" kern="1200">
+                <a:solidFill>
+                  <a:schemeClr val="tx1"/>
+                </a:solidFill>
+                <a:latin typeface="+mn-lt"/>
+                <a:ea typeface="+mn-ea"/>
+                <a:cs typeface="+mn-cs"/>
+              </a:defRPr>
+            </a:lvl5pPr>
+            <a:lvl6pPr marL="2286000" indent="0" algn="ctr" defTabSz="914400" rtl="0" eaLnBrk="1" latinLnBrk="0" hangingPunct="1">
+              <a:lnSpc>
+                <a:spcPct val="90000"/>
+              </a:lnSpc>
+              <a:spcBef>
+                <a:spcPts val="500"/>
+              </a:spcBef>
+              <a:buFont typeface="Arial" panose="020B0604020202020204" pitchFamily="34" charset="0"/>
+              <a:buNone/>
+              <a:defRPr sz="1600" kern="1200">
+                <a:solidFill>
+                  <a:schemeClr val="tx1"/>
+                </a:solidFill>
+                <a:latin typeface="+mn-lt"/>
+                <a:ea typeface="+mn-ea"/>
+                <a:cs typeface="+mn-cs"/>
+              </a:defRPr>
+            </a:lvl6pPr>
+            <a:lvl7pPr marL="2743200" indent="0" algn="ctr" defTabSz="914400" rtl="0" eaLnBrk="1" latinLnBrk="0" hangingPunct="1">
+              <a:lnSpc>
+                <a:spcPct val="90000"/>
+              </a:lnSpc>
+              <a:spcBef>
+                <a:spcPts val="500"/>
+              </a:spcBef>
+              <a:buFont typeface="Arial" panose="020B0604020202020204" pitchFamily="34" charset="0"/>
+              <a:buNone/>
+              <a:defRPr sz="1600" kern="1200">
+                <a:solidFill>
+                  <a:schemeClr val="tx1"/>
+                </a:solidFill>
+                <a:latin typeface="+mn-lt"/>
+                <a:ea typeface="+mn-ea"/>
+                <a:cs typeface="+mn-cs"/>
+              </a:defRPr>
+            </a:lvl7pPr>
+            <a:lvl8pPr marL="3200400" indent="0" algn="ctr" defTabSz="914400" rtl="0" eaLnBrk="1" latinLnBrk="0" hangingPunct="1">
+              <a:lnSpc>
+                <a:spcPct val="90000"/>
+              </a:lnSpc>
+              <a:spcBef>
+                <a:spcPts val="500"/>
+              </a:spcBef>
+              <a:buFont typeface="Arial" panose="020B0604020202020204" pitchFamily="34" charset="0"/>
+              <a:buNone/>
+              <a:defRPr sz="1600" kern="1200">
+                <a:solidFill>
+                  <a:schemeClr val="tx1"/>
+                </a:solidFill>
+                <a:latin typeface="+mn-lt"/>
+                <a:ea typeface="+mn-ea"/>
+                <a:cs typeface="+mn-cs"/>
+              </a:defRPr>
+            </a:lvl8pPr>
+            <a:lvl9pPr marL="3657600" indent="0" algn="ctr" defTabSz="914400" rtl="0" eaLnBrk="1" latinLnBrk="0" hangingPunct="1">
+              <a:lnSpc>
+                <a:spcPct val="90000"/>
+              </a:lnSpc>
+              <a:spcBef>
+                <a:spcPts val="500"/>
+              </a:spcBef>
+              <a:buFont typeface="Arial" panose="020B0604020202020204" pitchFamily="34" charset="0"/>
+              <a:buNone/>
+              <a:defRPr sz="1600" kern="1200">
+                <a:solidFill>
+                  <a:schemeClr val="tx1"/>
+                </a:solidFill>
+                <a:latin typeface="+mn-lt"/>
+                <a:ea typeface="+mn-ea"/>
+                <a:cs typeface="+mn-cs"/>
+              </a:defRPr>
+            </a:lvl9pPr>
+          </a:lstStyle>
+          <a:p>
+            <a:pPr marL="342900" indent="-342900" algn="l">
+              <a:buFont typeface="Arial" panose="020B0604020202020204" pitchFamily="34" charset="0"/>
+              <a:buChar char="•"/>
+            </a:pPr>
             <a:r>
               <a:rPr lang="en-US" smtClean="0">
                 <a:latin typeface="Times New Roman" panose="02020603050405020304" pitchFamily="18" charset="0"/>
                 <a:cs typeface="Times New Roman" panose="02020603050405020304" pitchFamily="18" charset="0"/>
               </a:rPr>
-              <a:t> </a:t>
-            </a:r>
+              <a:t>Run test_model.py to test model with the test data folder (number of classes = 10)</a:t>
+            </a:r>
+          </a:p>
+          <a:p>
+            <a:pPr marL="800100" lvl="1" indent="-342900" algn="l">
+              <a:buFont typeface="Wingdings" panose="05000000000000000000" pitchFamily="2" charset="2"/>
+              <a:buChar char="Ø"/>
+            </a:pPr>
+            <a:r>
+              <a:rPr lang="en-US">
+                <a:latin typeface="Times New Roman" panose="02020603050405020304" pitchFamily="18" charset="0"/>
+                <a:cs typeface="Times New Roman" panose="02020603050405020304" pitchFamily="18" charset="0"/>
+              </a:rPr>
+              <a:t>python3 </a:t>
+            </a:r>
+            <a:r>
+              <a:rPr lang="en-US" smtClean="0">
+                <a:latin typeface="Times New Roman" panose="02020603050405020304" pitchFamily="18" charset="0"/>
+                <a:cs typeface="Times New Roman" panose="02020603050405020304" pitchFamily="18" charset="0"/>
+              </a:rPr>
+              <a:t>test_model_alexnet.py</a:t>
+            </a:r>
+          </a:p>
+          <a:p>
+            <a:pPr marL="800100" lvl="1" indent="-342900" algn="l">
+              <a:buFont typeface="Wingdings" panose="05000000000000000000" pitchFamily="2" charset="2"/>
+              <a:buChar char="Ø"/>
+            </a:pPr>
+            <a:r>
+              <a:rPr lang="en-US" smtClean="0">
+                <a:latin typeface="Times New Roman" panose="02020603050405020304" pitchFamily="18" charset="0"/>
+                <a:cs typeface="Times New Roman" panose="02020603050405020304" pitchFamily="18" charset="0"/>
+              </a:rPr>
+              <a:t>The </a:t>
+            </a:r>
+            <a:r>
+              <a:rPr lang="en-US" smtClean="0">
+                <a:latin typeface="Times New Roman" panose="02020603050405020304" pitchFamily="18" charset="0"/>
+                <a:cs typeface="Times New Roman" panose="02020603050405020304" pitchFamily="18" charset="0"/>
+              </a:rPr>
+              <a:t>result after retest model with test data</a:t>
+            </a:r>
+          </a:p>
+          <a:p>
+            <a:pPr marL="1257300" lvl="2" indent="-342900" algn="l">
+              <a:buFont typeface="Wingdings" panose="05000000000000000000" pitchFamily="2" charset="2"/>
+              <a:buChar char="Ø"/>
+            </a:pPr>
             <a:endParaRPr lang="en-US">
               <a:latin typeface="Times New Roman" panose="02020603050405020304" pitchFamily="18" charset="0"/>
               <a:cs typeface="Times New Roman" panose="02020603050405020304" pitchFamily="18" charset="0"/>
@@ -5121,10 +6206,491 @@
           </a:p>
         </p:txBody>
       </p:sp>
+      <p:sp>
+        <p:nvSpPr>
+          <p:cNvPr id="4" name="Titel 1"/>
+          <p:cNvSpPr txBox="1">
+            <a:spLocks/>
+          </p:cNvSpPr>
+          <p:nvPr/>
+        </p:nvSpPr>
+        <p:spPr>
+          <a:xfrm>
+            <a:off x="467999" y="423081"/>
+            <a:ext cx="11244575" cy="629655"/>
+          </a:xfrm>
+          <a:prstGeom prst="rect">
+            <a:avLst/>
+          </a:prstGeom>
+          <a:solidFill>
+            <a:schemeClr val="accent1">
+              <a:lumMod val="75000"/>
+            </a:schemeClr>
+          </a:solidFill>
+        </p:spPr>
+        <p:txBody>
+          <a:bodyPr vert="horz" lIns="91440" tIns="45720" rIns="91440" bIns="45720" rtlCol="0" anchor="b">
+            <a:normAutofit fontScale="77500" lnSpcReduction="20000"/>
+          </a:bodyPr>
+          <a:lstStyle>
+            <a:lvl1pPr algn="ctr" defTabSz="914400" rtl="0" eaLnBrk="1" latinLnBrk="0" hangingPunct="1">
+              <a:lnSpc>
+                <a:spcPct val="90000"/>
+              </a:lnSpc>
+              <a:spcBef>
+                <a:spcPct val="0"/>
+              </a:spcBef>
+              <a:buNone/>
+              <a:defRPr sz="6000" kern="1200">
+                <a:solidFill>
+                  <a:schemeClr val="tx1"/>
+                </a:solidFill>
+                <a:latin typeface="+mj-lt"/>
+                <a:ea typeface="+mj-ea"/>
+                <a:cs typeface="+mj-cs"/>
+              </a:defRPr>
+            </a:lvl1pPr>
+          </a:lstStyle>
+          <a:p>
+            <a:pPr algn="l"/>
+            <a:r>
+              <a:rPr lang="en-US" b="1" cap="all">
+                <a:solidFill>
+                  <a:schemeClr val="bg1"/>
+                </a:solidFill>
+                <a:latin typeface="Times New Roman" panose="02020603050405020304" pitchFamily="18" charset="0"/>
+                <a:cs typeface="Times New Roman" panose="02020603050405020304" pitchFamily="18" charset="0"/>
+              </a:rPr>
+              <a:t>Model 2 (Alexnet structure)</a:t>
+            </a:r>
+            <a:endParaRPr lang="en-US" b="1" dirty="0">
+              <a:solidFill>
+                <a:schemeClr val="bg1"/>
+              </a:solidFill>
+              <a:latin typeface="Times New Roman" panose="02020603050405020304" pitchFamily="18" charset="0"/>
+              <a:cs typeface="Times New Roman" panose="02020603050405020304" pitchFamily="18" charset="0"/>
+            </a:endParaRPr>
+          </a:p>
+        </p:txBody>
+      </p:sp>
+      <p:pic>
+        <p:nvPicPr>
+          <p:cNvPr id="3" name="Picture 2"/>
+          <p:cNvPicPr>
+            <a:picLocks noChangeAspect="1"/>
+          </p:cNvPicPr>
+          <p:nvPr/>
+        </p:nvPicPr>
+        <p:blipFill>
+          <a:blip r:embed="rId2"/>
+          <a:stretch>
+            <a:fillRect/>
+          </a:stretch>
+        </p:blipFill>
+        <p:spPr>
+          <a:xfrm>
+            <a:off x="1199891" y="2740450"/>
+            <a:ext cx="8087605" cy="917150"/>
+          </a:xfrm>
+          <a:prstGeom prst="rect">
+            <a:avLst/>
+          </a:prstGeom>
+        </p:spPr>
+      </p:pic>
     </p:spTree>
     <p:extLst>
       <p:ext uri="{BB962C8B-B14F-4D97-AF65-F5344CB8AC3E}">
-        <p14:creationId xmlns:p14="http://schemas.microsoft.com/office/powerpoint/2010/main" val="1148817094"/>
+        <p14:creationId xmlns:p14="http://schemas.microsoft.com/office/powerpoint/2010/main" val="640403535"/>
+      </p:ext>
+    </p:extLst>
+  </p:cSld>
+  <p:clrMapOvr>
+    <a:masterClrMapping/>
+  </p:clrMapOvr>
+</p:sld>
+</file>
+
+<file path=ppt/slides/slide9.xml><?xml version="1.0" encoding="utf-8"?>
+<p:sld xmlns:a="http://schemas.openxmlformats.org/drawingml/2006/main" xmlns:r="http://schemas.openxmlformats.org/officeDocument/2006/relationships" xmlns:p="http://schemas.openxmlformats.org/presentationml/2006/main">
+  <p:cSld>
+    <p:spTree>
+      <p:nvGrpSpPr>
+        <p:cNvPr id="1" name=""/>
+        <p:cNvGrpSpPr/>
+        <p:nvPr/>
+      </p:nvGrpSpPr>
+      <p:grpSpPr>
+        <a:xfrm>
+          <a:off x="0" y="0"/>
+          <a:ext cx="0" cy="0"/>
+          <a:chOff x="0" y="0"/>
+          <a:chExt cx="0" cy="0"/>
+        </a:xfrm>
+      </p:grpSpPr>
+      <p:sp>
+        <p:nvSpPr>
+          <p:cNvPr id="6" name="Inhaltsplatzhalter 3"/>
+          <p:cNvSpPr txBox="1">
+            <a:spLocks/>
+          </p:cNvSpPr>
+          <p:nvPr/>
+        </p:nvSpPr>
+        <p:spPr>
+          <a:xfrm>
+            <a:off x="468000" y="1424991"/>
+            <a:ext cx="11244574" cy="4184239"/>
+          </a:xfrm>
+          <a:prstGeom prst="rect">
+            <a:avLst/>
+          </a:prstGeom>
+        </p:spPr>
+        <p:txBody>
+          <a:bodyPr vert="horz" lIns="91440" tIns="45720" rIns="91440" bIns="45720" rtlCol="0">
+            <a:normAutofit/>
+          </a:bodyPr>
+          <a:lstStyle>
+            <a:lvl1pPr marL="0" indent="0" algn="ctr" defTabSz="914400" rtl="0" eaLnBrk="1" latinLnBrk="0" hangingPunct="1">
+              <a:lnSpc>
+                <a:spcPct val="90000"/>
+              </a:lnSpc>
+              <a:spcBef>
+                <a:spcPts val="1000"/>
+              </a:spcBef>
+              <a:buFont typeface="Arial" panose="020B0604020202020204" pitchFamily="34" charset="0"/>
+              <a:buNone/>
+              <a:defRPr sz="2400" kern="1200">
+                <a:solidFill>
+                  <a:schemeClr val="tx1"/>
+                </a:solidFill>
+                <a:latin typeface="+mn-lt"/>
+                <a:ea typeface="+mn-ea"/>
+                <a:cs typeface="+mn-cs"/>
+              </a:defRPr>
+            </a:lvl1pPr>
+            <a:lvl2pPr marL="457200" indent="0" algn="ctr" defTabSz="914400" rtl="0" eaLnBrk="1" latinLnBrk="0" hangingPunct="1">
+              <a:lnSpc>
+                <a:spcPct val="90000"/>
+              </a:lnSpc>
+              <a:spcBef>
+                <a:spcPts val="500"/>
+              </a:spcBef>
+              <a:buFont typeface="Arial" panose="020B0604020202020204" pitchFamily="34" charset="0"/>
+              <a:buNone/>
+              <a:defRPr sz="2000" kern="1200">
+                <a:solidFill>
+                  <a:schemeClr val="tx1"/>
+                </a:solidFill>
+                <a:latin typeface="+mn-lt"/>
+                <a:ea typeface="+mn-ea"/>
+                <a:cs typeface="+mn-cs"/>
+              </a:defRPr>
+            </a:lvl2pPr>
+            <a:lvl3pPr marL="914400" indent="0" algn="ctr" defTabSz="914400" rtl="0" eaLnBrk="1" latinLnBrk="0" hangingPunct="1">
+              <a:lnSpc>
+                <a:spcPct val="90000"/>
+              </a:lnSpc>
+              <a:spcBef>
+                <a:spcPts val="500"/>
+              </a:spcBef>
+              <a:buFont typeface="Arial" panose="020B0604020202020204" pitchFamily="34" charset="0"/>
+              <a:buNone/>
+              <a:defRPr sz="1800" kern="1200">
+                <a:solidFill>
+                  <a:schemeClr val="tx1"/>
+                </a:solidFill>
+                <a:latin typeface="+mn-lt"/>
+                <a:ea typeface="+mn-ea"/>
+                <a:cs typeface="+mn-cs"/>
+              </a:defRPr>
+            </a:lvl3pPr>
+            <a:lvl4pPr marL="1371600" indent="0" algn="ctr" defTabSz="914400" rtl="0" eaLnBrk="1" latinLnBrk="0" hangingPunct="1">
+              <a:lnSpc>
+                <a:spcPct val="90000"/>
+              </a:lnSpc>
+              <a:spcBef>
+                <a:spcPts val="500"/>
+              </a:spcBef>
+              <a:buFont typeface="Arial" panose="020B0604020202020204" pitchFamily="34" charset="0"/>
+              <a:buNone/>
+              <a:defRPr sz="1600" kern="1200">
+                <a:solidFill>
+                  <a:schemeClr val="tx1"/>
+                </a:solidFill>
+                <a:latin typeface="+mn-lt"/>
+                <a:ea typeface="+mn-ea"/>
+                <a:cs typeface="+mn-cs"/>
+              </a:defRPr>
+            </a:lvl4pPr>
+            <a:lvl5pPr marL="1828800" indent="0" algn="ctr" defTabSz="914400" rtl="0" eaLnBrk="1" latinLnBrk="0" hangingPunct="1">
+              <a:lnSpc>
+                <a:spcPct val="90000"/>
+              </a:lnSpc>
+              <a:spcBef>
+                <a:spcPts val="500"/>
+              </a:spcBef>
+              <a:buFont typeface="Arial" panose="020B0604020202020204" pitchFamily="34" charset="0"/>
+              <a:buNone/>
+              <a:defRPr sz="1600" kern="1200">
+                <a:solidFill>
+                  <a:schemeClr val="tx1"/>
+                </a:solidFill>
+                <a:latin typeface="+mn-lt"/>
+                <a:ea typeface="+mn-ea"/>
+                <a:cs typeface="+mn-cs"/>
+              </a:defRPr>
+            </a:lvl5pPr>
+            <a:lvl6pPr marL="2286000" indent="0" algn="ctr" defTabSz="914400" rtl="0" eaLnBrk="1" latinLnBrk="0" hangingPunct="1">
+              <a:lnSpc>
+                <a:spcPct val="90000"/>
+              </a:lnSpc>
+              <a:spcBef>
+                <a:spcPts val="500"/>
+              </a:spcBef>
+              <a:buFont typeface="Arial" panose="020B0604020202020204" pitchFamily="34" charset="0"/>
+              <a:buNone/>
+              <a:defRPr sz="1600" kern="1200">
+                <a:solidFill>
+                  <a:schemeClr val="tx1"/>
+                </a:solidFill>
+                <a:latin typeface="+mn-lt"/>
+                <a:ea typeface="+mn-ea"/>
+                <a:cs typeface="+mn-cs"/>
+              </a:defRPr>
+            </a:lvl6pPr>
+            <a:lvl7pPr marL="2743200" indent="0" algn="ctr" defTabSz="914400" rtl="0" eaLnBrk="1" latinLnBrk="0" hangingPunct="1">
+              <a:lnSpc>
+                <a:spcPct val="90000"/>
+              </a:lnSpc>
+              <a:spcBef>
+                <a:spcPts val="500"/>
+              </a:spcBef>
+              <a:buFont typeface="Arial" panose="020B0604020202020204" pitchFamily="34" charset="0"/>
+              <a:buNone/>
+              <a:defRPr sz="1600" kern="1200">
+                <a:solidFill>
+                  <a:schemeClr val="tx1"/>
+                </a:solidFill>
+                <a:latin typeface="+mn-lt"/>
+                <a:ea typeface="+mn-ea"/>
+                <a:cs typeface="+mn-cs"/>
+              </a:defRPr>
+            </a:lvl7pPr>
+            <a:lvl8pPr marL="3200400" indent="0" algn="ctr" defTabSz="914400" rtl="0" eaLnBrk="1" latinLnBrk="0" hangingPunct="1">
+              <a:lnSpc>
+                <a:spcPct val="90000"/>
+              </a:lnSpc>
+              <a:spcBef>
+                <a:spcPts val="500"/>
+              </a:spcBef>
+              <a:buFont typeface="Arial" panose="020B0604020202020204" pitchFamily="34" charset="0"/>
+              <a:buNone/>
+              <a:defRPr sz="1600" kern="1200">
+                <a:solidFill>
+                  <a:schemeClr val="tx1"/>
+                </a:solidFill>
+                <a:latin typeface="+mn-lt"/>
+                <a:ea typeface="+mn-ea"/>
+                <a:cs typeface="+mn-cs"/>
+              </a:defRPr>
+            </a:lvl8pPr>
+            <a:lvl9pPr marL="3657600" indent="0" algn="ctr" defTabSz="914400" rtl="0" eaLnBrk="1" latinLnBrk="0" hangingPunct="1">
+              <a:lnSpc>
+                <a:spcPct val="90000"/>
+              </a:lnSpc>
+              <a:spcBef>
+                <a:spcPts val="500"/>
+              </a:spcBef>
+              <a:buFont typeface="Arial" panose="020B0604020202020204" pitchFamily="34" charset="0"/>
+              <a:buNone/>
+              <a:defRPr sz="1600" kern="1200">
+                <a:solidFill>
+                  <a:schemeClr val="tx1"/>
+                </a:solidFill>
+                <a:latin typeface="+mn-lt"/>
+                <a:ea typeface="+mn-ea"/>
+                <a:cs typeface="+mn-cs"/>
+              </a:defRPr>
+            </a:lvl9pPr>
+          </a:lstStyle>
+          <a:p>
+            <a:pPr marL="342900" indent="-342900" algn="l">
+              <a:buFont typeface="Arial" panose="020B0604020202020204" pitchFamily="34" charset="0"/>
+              <a:buChar char="•"/>
+            </a:pPr>
+            <a:r>
+              <a:rPr lang="en-US" smtClean="0">
+                <a:latin typeface="Times New Roman" panose="02020603050405020304" pitchFamily="18" charset="0"/>
+                <a:cs typeface="Times New Roman" panose="02020603050405020304" pitchFamily="18" charset="0"/>
+              </a:rPr>
+              <a:t>Conclusion </a:t>
+            </a:r>
+          </a:p>
+          <a:p>
+            <a:pPr marL="1257300" lvl="2" indent="-342900" algn="l">
+              <a:buFont typeface="Wingdings" panose="05000000000000000000" pitchFamily="2" charset="2"/>
+              <a:buChar char="Ø"/>
+            </a:pPr>
+            <a:r>
+              <a:rPr lang="en-US" smtClean="0">
+                <a:latin typeface="Times New Roman" panose="02020603050405020304" pitchFamily="18" charset="0"/>
+                <a:cs typeface="Times New Roman" panose="02020603050405020304" pitchFamily="18" charset="0"/>
+              </a:rPr>
+              <a:t>The accuracy is low </a:t>
+            </a:r>
+            <a:r>
+              <a:rPr lang="en-US" smtClean="0">
+                <a:latin typeface="Times New Roman" panose="02020603050405020304" pitchFamily="18" charset="0"/>
+                <a:cs typeface="Times New Roman" panose="02020603050405020304" pitchFamily="18" charset="0"/>
+              </a:rPr>
+              <a:t>(Model 1: 54.55</a:t>
+            </a:r>
+            <a:r>
+              <a:rPr lang="en-US" smtClean="0">
+                <a:latin typeface="Times New Roman" panose="02020603050405020304" pitchFamily="18" charset="0"/>
+                <a:cs typeface="Times New Roman" panose="02020603050405020304" pitchFamily="18" charset="0"/>
+              </a:rPr>
+              <a:t>% with validation data and 40% with test </a:t>
+            </a:r>
+            <a:r>
+              <a:rPr lang="en-US" smtClean="0">
+                <a:latin typeface="Times New Roman" panose="02020603050405020304" pitchFamily="18" charset="0"/>
+                <a:cs typeface="Times New Roman" panose="02020603050405020304" pitchFamily="18" charset="0"/>
+              </a:rPr>
+              <a:t>data; Model 2: 17.24% </a:t>
+            </a:r>
+            <a:r>
+              <a:rPr lang="en-US">
+                <a:latin typeface="Times New Roman" panose="02020603050405020304" pitchFamily="18" charset="0"/>
+                <a:cs typeface="Times New Roman" panose="02020603050405020304" pitchFamily="18" charset="0"/>
+              </a:rPr>
+              <a:t>with validation data </a:t>
+            </a:r>
+            <a:r>
+              <a:rPr lang="en-US">
+                <a:latin typeface="Times New Roman" panose="02020603050405020304" pitchFamily="18" charset="0"/>
+                <a:cs typeface="Times New Roman" panose="02020603050405020304" pitchFamily="18" charset="0"/>
+              </a:rPr>
+              <a:t>and </a:t>
+            </a:r>
+            <a:r>
+              <a:rPr lang="en-US" smtClean="0">
+                <a:latin typeface="Times New Roman" panose="02020603050405020304" pitchFamily="18" charset="0"/>
+                <a:cs typeface="Times New Roman" panose="02020603050405020304" pitchFamily="18" charset="0"/>
+              </a:rPr>
+              <a:t>10</a:t>
+            </a:r>
+            <a:r>
+              <a:rPr lang="en-US">
+                <a:latin typeface="Times New Roman" panose="02020603050405020304" pitchFamily="18" charset="0"/>
+                <a:cs typeface="Times New Roman" panose="02020603050405020304" pitchFamily="18" charset="0"/>
+              </a:rPr>
+              <a:t>% with test data) because </a:t>
+            </a:r>
+            <a:r>
+              <a:rPr lang="en-US" smtClean="0">
+                <a:latin typeface="Times New Roman" panose="02020603050405020304" pitchFamily="18" charset="0"/>
+                <a:cs typeface="Times New Roman" panose="02020603050405020304" pitchFamily="18" charset="0"/>
+              </a:rPr>
+              <a:t>of 2 reason:</a:t>
+            </a:r>
+          </a:p>
+          <a:p>
+            <a:pPr marL="1714500" lvl="3" indent="-342900" algn="l">
+              <a:buFont typeface="Wingdings" panose="05000000000000000000" pitchFamily="2" charset="2"/>
+              <a:buChar char="Ø"/>
+            </a:pPr>
+            <a:r>
+              <a:rPr lang="en-US" smtClean="0">
+                <a:latin typeface="Times New Roman" panose="02020603050405020304" pitchFamily="18" charset="0"/>
+                <a:cs typeface="Times New Roman" panose="02020603050405020304" pitchFamily="18" charset="0"/>
+              </a:rPr>
+              <a:t> the train data is </a:t>
+            </a:r>
+            <a:r>
+              <a:rPr lang="en-US" smtClean="0">
+                <a:latin typeface="Times New Roman" panose="02020603050405020304" pitchFamily="18" charset="0"/>
+                <a:cs typeface="Times New Roman" panose="02020603050405020304" pitchFamily="18" charset="0"/>
+              </a:rPr>
+              <a:t>small (number of images for each class is small)</a:t>
+            </a:r>
+            <a:endParaRPr lang="en-US" smtClean="0">
+              <a:latin typeface="Times New Roman" panose="02020603050405020304" pitchFamily="18" charset="0"/>
+              <a:cs typeface="Times New Roman" panose="02020603050405020304" pitchFamily="18" charset="0"/>
+            </a:endParaRPr>
+          </a:p>
+        </p:txBody>
+      </p:sp>
+      <p:sp>
+        <p:nvSpPr>
+          <p:cNvPr id="3" name="Titel 1"/>
+          <p:cNvSpPr txBox="1">
+            <a:spLocks/>
+          </p:cNvSpPr>
+          <p:nvPr/>
+        </p:nvSpPr>
+        <p:spPr>
+          <a:xfrm>
+            <a:off x="467999" y="423081"/>
+            <a:ext cx="11244575" cy="629655"/>
+          </a:xfrm>
+          <a:prstGeom prst="rect">
+            <a:avLst/>
+          </a:prstGeom>
+          <a:solidFill>
+            <a:schemeClr val="accent1">
+              <a:lumMod val="75000"/>
+            </a:schemeClr>
+          </a:solidFill>
+        </p:spPr>
+        <p:txBody>
+          <a:bodyPr vert="horz" lIns="91440" tIns="45720" rIns="91440" bIns="45720" rtlCol="0" anchor="b">
+            <a:normAutofit fontScale="77500" lnSpcReduction="20000"/>
+          </a:bodyPr>
+          <a:lstStyle>
+            <a:lvl1pPr algn="ctr" defTabSz="914400" rtl="0" eaLnBrk="1" latinLnBrk="0" hangingPunct="1">
+              <a:lnSpc>
+                <a:spcPct val="90000"/>
+              </a:lnSpc>
+              <a:spcBef>
+                <a:spcPct val="0"/>
+              </a:spcBef>
+              <a:buNone/>
+              <a:defRPr sz="6000" kern="1200">
+                <a:solidFill>
+                  <a:schemeClr val="tx1"/>
+                </a:solidFill>
+                <a:latin typeface="+mj-lt"/>
+                <a:ea typeface="+mj-ea"/>
+                <a:cs typeface="+mj-cs"/>
+              </a:defRPr>
+            </a:lvl1pPr>
+          </a:lstStyle>
+          <a:p>
+            <a:pPr algn="l"/>
+            <a:r>
+              <a:rPr lang="en-US" b="1" cap="all" smtClean="0">
+                <a:solidFill>
+                  <a:schemeClr val="bg1"/>
+                </a:solidFill>
+                <a:latin typeface="Times New Roman" panose="02020603050405020304" pitchFamily="18" charset="0"/>
+                <a:cs typeface="Times New Roman" panose="02020603050405020304" pitchFamily="18" charset="0"/>
+              </a:rPr>
+              <a:t>conclusion</a:t>
+            </a:r>
+            <a:endParaRPr lang="en-US" b="1" dirty="0">
+              <a:solidFill>
+                <a:schemeClr val="bg1"/>
+              </a:solidFill>
+              <a:latin typeface="Times New Roman" panose="02020603050405020304" pitchFamily="18" charset="0"/>
+              <a:cs typeface="Times New Roman" panose="02020603050405020304" pitchFamily="18" charset="0"/>
+            </a:endParaRPr>
+          </a:p>
+        </p:txBody>
+      </p:sp>
+    </p:spTree>
+    <p:extLst>
+      <p:ext uri="{BB962C8B-B14F-4D97-AF65-F5344CB8AC3E}">
+        <p14:creationId xmlns:p14="http://schemas.microsoft.com/office/powerpoint/2010/main" val="38664646"/>
       </p:ext>
     </p:extLst>
   </p:cSld>

</xml_diff>